<commit_message>
[pep-602] [pep-569] Adjust beta phase
You're welcome Fedora ;-) ...and thanks for all your help!
</commit_message>
<xml_diff>
--- a/pep-0602-example-release-calendar.pptx
+++ b/pep-0602-example-release-calendar.pptx
@@ -243,7 +243,7 @@
           <a:p>
             <a:fld id="{F9799CEE-6B71-6241-B003-A86B3CA3EA7C}" type="datetimeFigureOut">
               <a:rPr lang="en-US" smtClean="0"/>
-              <a:t>9/12/19</a:t>
+              <a:t>11/6/19</a:t>
             </a:fld>
             <a:endParaRPr lang="en-US"/>
           </a:p>
@@ -413,7 +413,7 @@
           <a:p>
             <a:fld id="{F9799CEE-6B71-6241-B003-A86B3CA3EA7C}" type="datetimeFigureOut">
               <a:rPr lang="en-US" smtClean="0"/>
-              <a:t>9/12/19</a:t>
+              <a:t>11/6/19</a:t>
             </a:fld>
             <a:endParaRPr lang="en-US"/>
           </a:p>
@@ -593,7 +593,7 @@
           <a:p>
             <a:fld id="{F9799CEE-6B71-6241-B003-A86B3CA3EA7C}" type="datetimeFigureOut">
               <a:rPr lang="en-US" smtClean="0"/>
-              <a:t>9/12/19</a:t>
+              <a:t>11/6/19</a:t>
             </a:fld>
             <a:endParaRPr lang="en-US"/>
           </a:p>
@@ -763,7 +763,7 @@
           <a:p>
             <a:fld id="{F9799CEE-6B71-6241-B003-A86B3CA3EA7C}" type="datetimeFigureOut">
               <a:rPr lang="en-US" smtClean="0"/>
-              <a:t>9/12/19</a:t>
+              <a:t>11/6/19</a:t>
             </a:fld>
             <a:endParaRPr lang="en-US"/>
           </a:p>
@@ -1009,7 +1009,7 @@
           <a:p>
             <a:fld id="{F9799CEE-6B71-6241-B003-A86B3CA3EA7C}" type="datetimeFigureOut">
               <a:rPr lang="en-US" smtClean="0"/>
-              <a:t>9/12/19</a:t>
+              <a:t>11/6/19</a:t>
             </a:fld>
             <a:endParaRPr lang="en-US"/>
           </a:p>
@@ -1241,7 +1241,7 @@
           <a:p>
             <a:fld id="{F9799CEE-6B71-6241-B003-A86B3CA3EA7C}" type="datetimeFigureOut">
               <a:rPr lang="en-US" smtClean="0"/>
-              <a:t>9/12/19</a:t>
+              <a:t>11/6/19</a:t>
             </a:fld>
             <a:endParaRPr lang="en-US"/>
           </a:p>
@@ -1608,7 +1608,7 @@
           <a:p>
             <a:fld id="{F9799CEE-6B71-6241-B003-A86B3CA3EA7C}" type="datetimeFigureOut">
               <a:rPr lang="en-US" smtClean="0"/>
-              <a:t>9/12/19</a:t>
+              <a:t>11/6/19</a:t>
             </a:fld>
             <a:endParaRPr lang="en-US"/>
           </a:p>
@@ -1726,7 +1726,7 @@
           <a:p>
             <a:fld id="{F9799CEE-6B71-6241-B003-A86B3CA3EA7C}" type="datetimeFigureOut">
               <a:rPr lang="en-US" smtClean="0"/>
-              <a:t>9/12/19</a:t>
+              <a:t>11/6/19</a:t>
             </a:fld>
             <a:endParaRPr lang="en-US"/>
           </a:p>
@@ -1821,7 +1821,7 @@
           <a:p>
             <a:fld id="{F9799CEE-6B71-6241-B003-A86B3CA3EA7C}" type="datetimeFigureOut">
               <a:rPr lang="en-US" smtClean="0"/>
-              <a:t>9/12/19</a:t>
+              <a:t>11/6/19</a:t>
             </a:fld>
             <a:endParaRPr lang="en-US"/>
           </a:p>
@@ -2098,7 +2098,7 @@
           <a:p>
             <a:fld id="{F9799CEE-6B71-6241-B003-A86B3CA3EA7C}" type="datetimeFigureOut">
               <a:rPr lang="en-US" smtClean="0"/>
-              <a:t>9/12/19</a:t>
+              <a:t>11/6/19</a:t>
             </a:fld>
             <a:endParaRPr lang="en-US"/>
           </a:p>
@@ -2355,7 +2355,7 @@
           <a:p>
             <a:fld id="{F9799CEE-6B71-6241-B003-A86B3CA3EA7C}" type="datetimeFigureOut">
               <a:rPr lang="en-US" smtClean="0"/>
-              <a:t>9/12/19</a:t>
+              <a:t>11/6/19</a:t>
             </a:fld>
             <a:endParaRPr lang="en-US"/>
           </a:p>
@@ -2568,7 +2568,7 @@
           <a:p>
             <a:fld id="{F9799CEE-6B71-6241-B003-A86B3CA3EA7C}" type="datetimeFigureOut">
               <a:rPr lang="en-US" smtClean="0"/>
-              <a:t>9/12/19</a:t>
+              <a:t>11/6/19</a:t>
             </a:fld>
             <a:endParaRPr lang="en-US"/>
           </a:p>
@@ -4878,7 +4878,7 @@
         <p:spPr>
           <a:xfrm>
             <a:off x="3465745" y="748010"/>
-            <a:ext cx="1148317" cy="1379475"/>
+            <a:ext cx="859559" cy="1379475"/>
           </a:xfrm>
           <a:prstGeom prst="rect">
             <a:avLst/>
@@ -4931,8 +4931,8 @@
         </p:nvSpPr>
         <p:spPr>
           <a:xfrm>
-            <a:off x="4616777" y="745067"/>
-            <a:ext cx="299721" cy="1382417"/>
+            <a:off x="4321509" y="745067"/>
+            <a:ext cx="594989" cy="1382417"/>
           </a:xfrm>
           <a:prstGeom prst="rect">
             <a:avLst/>
@@ -6719,8 +6719,8 @@
         </p:nvSpPr>
         <p:spPr>
           <a:xfrm>
-            <a:off x="4911754" y="2402250"/>
-            <a:ext cx="2025829" cy="970659"/>
+            <a:off x="4911755" y="2402250"/>
+            <a:ext cx="2011206" cy="970659"/>
           </a:xfrm>
           <a:prstGeom prst="rect">
             <a:avLst/>
@@ -6730,114 +6730,6 @@
               <a:lumMod val="75000"/>
               <a:alpha val="50000"/>
             </a:schemeClr>
-          </a:solidFill>
-          <a:ln>
-            <a:noFill/>
-          </a:ln>
-        </p:spPr>
-        <p:style>
-          <a:lnRef idx="2">
-            <a:schemeClr val="accent1">
-              <a:shade val="50000"/>
-            </a:schemeClr>
-          </a:lnRef>
-          <a:fillRef idx="1">
-            <a:schemeClr val="accent1"/>
-          </a:fillRef>
-          <a:effectRef idx="0">
-            <a:schemeClr val="accent1"/>
-          </a:effectRef>
-          <a:fontRef idx="minor">
-            <a:schemeClr val="lt1"/>
-          </a:fontRef>
-        </p:style>
-        <p:txBody>
-          <a:bodyPr rtlCol="0" anchor="ctr"/>
-          <a:lstStyle/>
-          <a:p>
-            <a:pPr algn="ctr"/>
-            <a:endParaRPr lang="en-US"/>
-          </a:p>
-        </p:txBody>
-      </p:sp>
-      <p:sp>
-        <p:nvSpPr>
-          <p:cNvPr id="141" name="Rectangle 140">
-            <a:extLst>
-              <a:ext uri="{FF2B5EF4-FFF2-40B4-BE49-F238E27FC236}">
-                <a16:creationId xmlns:a16="http://schemas.microsoft.com/office/drawing/2014/main" id="{D72C7758-829F-6D48-97EC-F3F3FFEB4323}"/>
-              </a:ext>
-            </a:extLst>
-          </p:cNvPr>
-          <p:cNvSpPr/>
-          <p:nvPr/>
-        </p:nvSpPr>
-        <p:spPr>
-          <a:xfrm>
-            <a:off x="6934170" y="2402251"/>
-            <a:ext cx="1155646" cy="970659"/>
-          </a:xfrm>
-          <a:prstGeom prst="rect">
-            <a:avLst/>
-          </a:prstGeom>
-          <a:solidFill>
-            <a:srgbClr val="FFC000">
-              <a:alpha val="50000"/>
-            </a:srgbClr>
-          </a:solidFill>
-          <a:ln>
-            <a:noFill/>
-          </a:ln>
-        </p:spPr>
-        <p:style>
-          <a:lnRef idx="2">
-            <a:schemeClr val="accent1">
-              <a:shade val="50000"/>
-            </a:schemeClr>
-          </a:lnRef>
-          <a:fillRef idx="1">
-            <a:schemeClr val="accent1"/>
-          </a:fillRef>
-          <a:effectRef idx="0">
-            <a:schemeClr val="accent1"/>
-          </a:effectRef>
-          <a:fontRef idx="minor">
-            <a:schemeClr val="lt1"/>
-          </a:fontRef>
-        </p:style>
-        <p:txBody>
-          <a:bodyPr rtlCol="0" anchor="ctr"/>
-          <a:lstStyle/>
-          <a:p>
-            <a:pPr algn="ctr"/>
-            <a:endParaRPr lang="en-US"/>
-          </a:p>
-        </p:txBody>
-      </p:sp>
-      <p:sp>
-        <p:nvSpPr>
-          <p:cNvPr id="142" name="Rectangle 141">
-            <a:extLst>
-              <a:ext uri="{FF2B5EF4-FFF2-40B4-BE49-F238E27FC236}">
-                <a16:creationId xmlns:a16="http://schemas.microsoft.com/office/drawing/2014/main" id="{C2CEBB98-37E2-294B-8AF8-61B9A34A0AED}"/>
-              </a:ext>
-            </a:extLst>
-          </p:cNvPr>
-          <p:cNvSpPr/>
-          <p:nvPr/>
-        </p:nvSpPr>
-        <p:spPr>
-          <a:xfrm>
-            <a:off x="8079087" y="2402250"/>
-            <a:ext cx="288114" cy="970659"/>
-          </a:xfrm>
-          <a:prstGeom prst="rect">
-            <a:avLst/>
-          </a:prstGeom>
-          <a:solidFill>
-            <a:srgbClr val="FFFF00">
-              <a:alpha val="40000"/>
-            </a:srgbClr>
           </a:solidFill>
           <a:ln>
             <a:noFill/>
@@ -7431,114 +7323,6 @@
       </p:sp>
       <p:sp>
         <p:nvSpPr>
-          <p:cNvPr id="145" name="Rectangle 144">
-            <a:extLst>
-              <a:ext uri="{FF2B5EF4-FFF2-40B4-BE49-F238E27FC236}">
-                <a16:creationId xmlns:a16="http://schemas.microsoft.com/office/drawing/2014/main" id="{1DE14E0A-1145-0E4E-9C71-C648D12664B3}"/>
-              </a:ext>
-            </a:extLst>
-          </p:cNvPr>
-          <p:cNvSpPr/>
-          <p:nvPr/>
-        </p:nvSpPr>
-        <p:spPr>
-          <a:xfrm>
-            <a:off x="10385303" y="3645924"/>
-            <a:ext cx="1146811" cy="970659"/>
-          </a:xfrm>
-          <a:prstGeom prst="rect">
-            <a:avLst/>
-          </a:prstGeom>
-          <a:solidFill>
-            <a:srgbClr val="FFC000">
-              <a:alpha val="50000"/>
-            </a:srgbClr>
-          </a:solidFill>
-          <a:ln>
-            <a:noFill/>
-          </a:ln>
-        </p:spPr>
-        <p:style>
-          <a:lnRef idx="2">
-            <a:schemeClr val="accent1">
-              <a:shade val="50000"/>
-            </a:schemeClr>
-          </a:lnRef>
-          <a:fillRef idx="1">
-            <a:schemeClr val="accent1"/>
-          </a:fillRef>
-          <a:effectRef idx="0">
-            <a:schemeClr val="accent1"/>
-          </a:effectRef>
-          <a:fontRef idx="minor">
-            <a:schemeClr val="lt1"/>
-          </a:fontRef>
-        </p:style>
-        <p:txBody>
-          <a:bodyPr rtlCol="0" anchor="ctr"/>
-          <a:lstStyle/>
-          <a:p>
-            <a:pPr algn="ctr"/>
-            <a:endParaRPr lang="en-US"/>
-          </a:p>
-        </p:txBody>
-      </p:sp>
-      <p:sp>
-        <p:nvSpPr>
-          <p:cNvPr id="146" name="Rectangle 145">
-            <a:extLst>
-              <a:ext uri="{FF2B5EF4-FFF2-40B4-BE49-F238E27FC236}">
-                <a16:creationId xmlns:a16="http://schemas.microsoft.com/office/drawing/2014/main" id="{3B631346-72D5-6D4E-AD91-5D5C37FE556A}"/>
-              </a:ext>
-            </a:extLst>
-          </p:cNvPr>
-          <p:cNvSpPr/>
-          <p:nvPr/>
-        </p:nvSpPr>
-        <p:spPr>
-          <a:xfrm>
-            <a:off x="11532114" y="3645923"/>
-            <a:ext cx="306303" cy="970659"/>
-          </a:xfrm>
-          <a:prstGeom prst="rect">
-            <a:avLst/>
-          </a:prstGeom>
-          <a:solidFill>
-            <a:srgbClr val="FFFF00">
-              <a:alpha val="40000"/>
-            </a:srgbClr>
-          </a:solidFill>
-          <a:ln>
-            <a:noFill/>
-          </a:ln>
-        </p:spPr>
-        <p:style>
-          <a:lnRef idx="2">
-            <a:schemeClr val="accent1">
-              <a:shade val="50000"/>
-            </a:schemeClr>
-          </a:lnRef>
-          <a:fillRef idx="1">
-            <a:schemeClr val="accent1"/>
-          </a:fillRef>
-          <a:effectRef idx="0">
-            <a:schemeClr val="accent1"/>
-          </a:effectRef>
-          <a:fontRef idx="minor">
-            <a:schemeClr val="lt1"/>
-          </a:fontRef>
-        </p:style>
-        <p:txBody>
-          <a:bodyPr rtlCol="0" anchor="ctr"/>
-          <a:lstStyle/>
-          <a:p>
-            <a:pPr algn="ctr"/>
-            <a:endParaRPr lang="en-US"/>
-          </a:p>
-        </p:txBody>
-      </p:sp>
-      <p:sp>
-        <p:nvSpPr>
           <p:cNvPr id="305" name="TextBox 304">
             <a:extLst>
               <a:ext uri="{FF2B5EF4-FFF2-40B4-BE49-F238E27FC236}">
@@ -7551,7 +7335,7 @@
         </p:nvSpPr>
         <p:spPr>
           <a:xfrm>
-            <a:off x="4592047" y="1178087"/>
+            <a:off x="4304637" y="1173031"/>
             <a:ext cx="368039" cy="246221"/>
           </a:xfrm>
           <a:prstGeom prst="rect">
@@ -7586,7 +7370,7 @@
         </p:nvSpPr>
         <p:spPr>
           <a:xfrm>
-            <a:off x="4618727" y="1178087"/>
+            <a:off x="4331317" y="1173031"/>
             <a:ext cx="48106" cy="246221"/>
           </a:xfrm>
           <a:prstGeom prst="rect">
@@ -7638,7 +7422,7 @@
         </p:nvSpPr>
         <p:spPr>
           <a:xfrm>
-            <a:off x="4652426" y="1424738"/>
+            <a:off x="4588170" y="1424738"/>
             <a:ext cx="368039" cy="246221"/>
           </a:xfrm>
           <a:prstGeom prst="rect">
@@ -7673,7 +7457,7 @@
         </p:nvSpPr>
         <p:spPr>
           <a:xfrm>
-            <a:off x="4679106" y="1424738"/>
+            <a:off x="4614850" y="1424738"/>
             <a:ext cx="48106" cy="246221"/>
           </a:xfrm>
           <a:prstGeom prst="rect">
@@ -8090,7 +7874,7 @@
           <a:noFill/>
         </p:spPr>
         <p:txBody>
-          <a:bodyPr wrap="none" rtlCol="0">
+          <a:bodyPr wrap="square" rtlCol="0">
             <a:spAutoFit/>
           </a:bodyPr>
           <a:lstStyle/>
@@ -8116,8 +7900,8 @@
         </p:nvSpPr>
         <p:spPr>
           <a:xfrm>
-            <a:off x="3460937" y="1181692"/>
-            <a:ext cx="45719" cy="246221"/>
+            <a:off x="3460936" y="1181692"/>
+            <a:ext cx="50400" cy="246221"/>
           </a:xfrm>
           <a:prstGeom prst="rect">
             <a:avLst/>
@@ -8170,7 +7954,7 @@
         </p:nvSpPr>
         <p:spPr>
           <a:xfrm>
-            <a:off x="3716803" y="1412266"/>
+            <a:off x="3618689" y="1423100"/>
             <a:ext cx="317716" cy="246221"/>
           </a:xfrm>
           <a:prstGeom prst="rect">
@@ -8179,7 +7963,7 @@
           <a:noFill/>
         </p:spPr>
         <p:txBody>
-          <a:bodyPr wrap="none" rtlCol="0">
+          <a:bodyPr wrap="square" rtlCol="0">
             <a:spAutoFit/>
           </a:bodyPr>
           <a:lstStyle/>
@@ -8205,8 +7989,8 @@
         </p:nvSpPr>
         <p:spPr>
           <a:xfrm>
-            <a:off x="3736706" y="1412266"/>
-            <a:ext cx="45719" cy="246221"/>
+            <a:off x="3638591" y="1423100"/>
+            <a:ext cx="50400" cy="246221"/>
           </a:xfrm>
           <a:prstGeom prst="rect">
             <a:avLst/>
@@ -8259,7 +8043,7 @@
         </p:nvSpPr>
         <p:spPr>
           <a:xfrm>
-            <a:off x="4015563" y="1662327"/>
+            <a:off x="3857829" y="1664508"/>
             <a:ext cx="317716" cy="246221"/>
           </a:xfrm>
           <a:prstGeom prst="rect">
@@ -8268,7 +8052,7 @@
           <a:noFill/>
         </p:spPr>
         <p:txBody>
-          <a:bodyPr wrap="none" rtlCol="0">
+          <a:bodyPr wrap="square" rtlCol="0">
             <a:spAutoFit/>
           </a:bodyPr>
           <a:lstStyle/>
@@ -8294,8 +8078,8 @@
         </p:nvSpPr>
         <p:spPr>
           <a:xfrm>
-            <a:off x="4035466" y="1662327"/>
-            <a:ext cx="45719" cy="246221"/>
+            <a:off x="3877731" y="1664508"/>
+            <a:ext cx="50400" cy="246221"/>
           </a:xfrm>
           <a:prstGeom prst="rect">
             <a:avLst/>
@@ -8348,7 +8132,7 @@
         </p:nvSpPr>
         <p:spPr>
           <a:xfrm>
-            <a:off x="4309846" y="1881262"/>
+            <a:off x="4083072" y="1898835"/>
             <a:ext cx="317716" cy="246221"/>
           </a:xfrm>
           <a:prstGeom prst="rect">
@@ -8357,7 +8141,7 @@
           <a:noFill/>
         </p:spPr>
         <p:txBody>
-          <a:bodyPr wrap="none" rtlCol="0">
+          <a:bodyPr wrap="square" rtlCol="0">
             <a:spAutoFit/>
           </a:bodyPr>
           <a:lstStyle/>
@@ -8383,8 +8167,8 @@
         </p:nvSpPr>
         <p:spPr>
           <a:xfrm>
-            <a:off x="4329749" y="1881262"/>
-            <a:ext cx="45719" cy="246221"/>
+            <a:off x="4102545" y="1904151"/>
+            <a:ext cx="50400" cy="224509"/>
           </a:xfrm>
           <a:prstGeom prst="rect">
             <a:avLst/>
@@ -8692,10 +8476,10 @@
       </p:sp>
       <p:sp>
         <p:nvSpPr>
-          <p:cNvPr id="357" name="TextBox 356">
-            <a:extLst>
-              <a:ext uri="{FF2B5EF4-FFF2-40B4-BE49-F238E27FC236}">
-                <a16:creationId xmlns:a16="http://schemas.microsoft.com/office/drawing/2014/main" id="{D93E8E1A-C789-C04D-B19C-EEF791FDFB35}"/>
+          <p:cNvPr id="362" name="TextBox 361">
+            <a:extLst>
+              <a:ext uri="{FF2B5EF4-FFF2-40B4-BE49-F238E27FC236}">
+                <a16:creationId xmlns:a16="http://schemas.microsoft.com/office/drawing/2014/main" id="{282F7632-5DAF-1F4A-A96C-EFA5627D5138}"/>
               </a:ext>
             </a:extLst>
           </p:cNvPr>
@@ -8704,8 +8488,8 @@
         </p:nvSpPr>
         <p:spPr>
           <a:xfrm>
-            <a:off x="8071224" y="2403772"/>
-            <a:ext cx="349776" cy="246221"/>
+            <a:off x="5761085" y="3137407"/>
+            <a:ext cx="311304" cy="246221"/>
           </a:xfrm>
           <a:prstGeom prst="rect">
             <a:avLst/>
@@ -8720,17 +8504,17 @@
           <a:p>
             <a:r>
               <a:rPr lang="en-US" sz="1000" dirty="0"/>
-              <a:t>rc1</a:t>
-            </a:r>
-          </a:p>
-        </p:txBody>
-      </p:sp>
-      <p:sp>
-        <p:nvSpPr>
-          <p:cNvPr id="358" name="Rectangle 357">
-            <a:extLst>
-              <a:ext uri="{FF2B5EF4-FFF2-40B4-BE49-F238E27FC236}">
-                <a16:creationId xmlns:a16="http://schemas.microsoft.com/office/drawing/2014/main" id="{B37A9129-212D-E94E-9660-02BD1DA3CBA6}"/>
+              <a:t>a4</a:t>
+            </a:r>
+          </a:p>
+        </p:txBody>
+      </p:sp>
+      <p:sp>
+        <p:nvSpPr>
+          <p:cNvPr id="363" name="Rectangle 362">
+            <a:extLst>
+              <a:ext uri="{FF2B5EF4-FFF2-40B4-BE49-F238E27FC236}">
+                <a16:creationId xmlns:a16="http://schemas.microsoft.com/office/drawing/2014/main" id="{20C2FC7B-B217-E74E-91D0-1A4178E59F99}"/>
               </a:ext>
             </a:extLst>
           </p:cNvPr>
@@ -8739,14 +8523,16 @@
         </p:nvSpPr>
         <p:spPr>
           <a:xfrm>
-            <a:off x="8091127" y="2403772"/>
+            <a:off x="5780988" y="3127247"/>
             <a:ext cx="45719" cy="246221"/>
           </a:xfrm>
           <a:prstGeom prst="rect">
             <a:avLst/>
           </a:prstGeom>
           <a:solidFill>
-            <a:schemeClr val="accent4"/>
+            <a:schemeClr val="accent2">
+              <a:lumMod val="75000"/>
+            </a:schemeClr>
           </a:solidFill>
           <a:ln>
             <a:noFill/>
@@ -8779,10 +8565,10 @@
       </p:sp>
       <p:sp>
         <p:nvSpPr>
-          <p:cNvPr id="360" name="TextBox 359">
-            <a:extLst>
-              <a:ext uri="{FF2B5EF4-FFF2-40B4-BE49-F238E27FC236}">
-                <a16:creationId xmlns:a16="http://schemas.microsoft.com/office/drawing/2014/main" id="{41979051-C81B-0C4A-B8BF-27EF43A58F40}"/>
+          <p:cNvPr id="364" name="TextBox 363">
+            <a:extLst>
+              <a:ext uri="{FF2B5EF4-FFF2-40B4-BE49-F238E27FC236}">
+                <a16:creationId xmlns:a16="http://schemas.microsoft.com/office/drawing/2014/main" id="{D39BC3D3-5689-344B-A443-95577D6AC364}"/>
               </a:ext>
             </a:extLst>
           </p:cNvPr>
@@ -8791,8 +8577,8 @@
         </p:nvSpPr>
         <p:spPr>
           <a:xfrm>
-            <a:off x="8116943" y="2646718"/>
-            <a:ext cx="349776" cy="246221"/>
+            <a:off x="6037198" y="2400497"/>
+            <a:ext cx="311304" cy="246221"/>
           </a:xfrm>
           <a:prstGeom prst="rect">
             <a:avLst/>
@@ -8807,17 +8593,17 @@
           <a:p>
             <a:r>
               <a:rPr lang="en-US" sz="1000" dirty="0"/>
-              <a:t>rc2</a:t>
-            </a:r>
-          </a:p>
-        </p:txBody>
-      </p:sp>
-      <p:sp>
-        <p:nvSpPr>
-          <p:cNvPr id="361" name="Rectangle 360">
-            <a:extLst>
-              <a:ext uri="{FF2B5EF4-FFF2-40B4-BE49-F238E27FC236}">
-                <a16:creationId xmlns:a16="http://schemas.microsoft.com/office/drawing/2014/main" id="{88B25314-025D-904F-879E-7A37C6B39347}"/>
+              <a:t>a5</a:t>
+            </a:r>
+          </a:p>
+        </p:txBody>
+      </p:sp>
+      <p:sp>
+        <p:nvSpPr>
+          <p:cNvPr id="365" name="Rectangle 364">
+            <a:extLst>
+              <a:ext uri="{FF2B5EF4-FFF2-40B4-BE49-F238E27FC236}">
+                <a16:creationId xmlns:a16="http://schemas.microsoft.com/office/drawing/2014/main" id="{615FE16F-6DBF-824E-953A-4C555042EABA}"/>
               </a:ext>
             </a:extLst>
           </p:cNvPr>
@@ -8826,14 +8612,16 @@
         </p:nvSpPr>
         <p:spPr>
           <a:xfrm>
-            <a:off x="8136846" y="2646718"/>
+            <a:off x="6057101" y="2400497"/>
             <a:ext cx="45719" cy="246221"/>
           </a:xfrm>
           <a:prstGeom prst="rect">
             <a:avLst/>
           </a:prstGeom>
           <a:solidFill>
-            <a:schemeClr val="accent4"/>
+            <a:schemeClr val="accent2">
+              <a:lumMod val="75000"/>
+            </a:schemeClr>
           </a:solidFill>
           <a:ln>
             <a:noFill/>
@@ -8866,10 +8654,10 @@
       </p:sp>
       <p:sp>
         <p:nvSpPr>
-          <p:cNvPr id="362" name="TextBox 361">
-            <a:extLst>
-              <a:ext uri="{FF2B5EF4-FFF2-40B4-BE49-F238E27FC236}">
-                <a16:creationId xmlns:a16="http://schemas.microsoft.com/office/drawing/2014/main" id="{282F7632-5DAF-1F4A-A96C-EFA5627D5138}"/>
+          <p:cNvPr id="366" name="TextBox 365">
+            <a:extLst>
+              <a:ext uri="{FF2B5EF4-FFF2-40B4-BE49-F238E27FC236}">
+                <a16:creationId xmlns:a16="http://schemas.microsoft.com/office/drawing/2014/main" id="{5E310240-4F39-DC49-BCC4-590DA821005C}"/>
               </a:ext>
             </a:extLst>
           </p:cNvPr>
@@ -8878,7 +8666,7 @@
         </p:nvSpPr>
         <p:spPr>
           <a:xfrm>
-            <a:off x="5761085" y="3137407"/>
+            <a:off x="6322140" y="2653168"/>
             <a:ext cx="311304" cy="246221"/>
           </a:xfrm>
           <a:prstGeom prst="rect">
@@ -8887,24 +8675,24 @@
           <a:noFill/>
         </p:spPr>
         <p:txBody>
-          <a:bodyPr wrap="none" rtlCol="0">
+          <a:bodyPr wrap="square" rtlCol="0">
             <a:spAutoFit/>
           </a:bodyPr>
           <a:lstStyle/>
           <a:p>
             <a:r>
               <a:rPr lang="en-US" sz="1000" dirty="0"/>
-              <a:t>a4</a:t>
-            </a:r>
-          </a:p>
-        </p:txBody>
-      </p:sp>
-      <p:sp>
-        <p:nvSpPr>
-          <p:cNvPr id="363" name="Rectangle 362">
-            <a:extLst>
-              <a:ext uri="{FF2B5EF4-FFF2-40B4-BE49-F238E27FC236}">
-                <a16:creationId xmlns:a16="http://schemas.microsoft.com/office/drawing/2014/main" id="{20C2FC7B-B217-E74E-91D0-1A4178E59F99}"/>
+              <a:t>a6</a:t>
+            </a:r>
+          </a:p>
+        </p:txBody>
+      </p:sp>
+      <p:sp>
+        <p:nvSpPr>
+          <p:cNvPr id="367" name="Rectangle 366">
+            <a:extLst>
+              <a:ext uri="{FF2B5EF4-FFF2-40B4-BE49-F238E27FC236}">
+                <a16:creationId xmlns:a16="http://schemas.microsoft.com/office/drawing/2014/main" id="{42672C61-4316-7444-8000-CFDD967C8616}"/>
               </a:ext>
             </a:extLst>
           </p:cNvPr>
@@ -8913,7 +8701,7 @@
         </p:nvSpPr>
         <p:spPr>
           <a:xfrm>
-            <a:off x="5780988" y="3127247"/>
+            <a:off x="6342043" y="2653168"/>
             <a:ext cx="45719" cy="246221"/>
           </a:xfrm>
           <a:prstGeom prst="rect">
@@ -8955,10 +8743,10 @@
       </p:sp>
       <p:sp>
         <p:nvSpPr>
-          <p:cNvPr id="364" name="TextBox 363">
-            <a:extLst>
-              <a:ext uri="{FF2B5EF4-FFF2-40B4-BE49-F238E27FC236}">
-                <a16:creationId xmlns:a16="http://schemas.microsoft.com/office/drawing/2014/main" id="{D39BC3D3-5689-344B-A443-95577D6AC364}"/>
+          <p:cNvPr id="368" name="TextBox 367">
+            <a:extLst>
+              <a:ext uri="{FF2B5EF4-FFF2-40B4-BE49-F238E27FC236}">
+                <a16:creationId xmlns:a16="http://schemas.microsoft.com/office/drawing/2014/main" id="{8C90C624-816C-D84A-8EB4-7C6DB9CF9695}"/>
               </a:ext>
             </a:extLst>
           </p:cNvPr>
@@ -8967,7 +8755,7 @@
         </p:nvSpPr>
         <p:spPr>
           <a:xfrm>
-            <a:off x="6037198" y="2400497"/>
+            <a:off x="6599695" y="2916598"/>
             <a:ext cx="311304" cy="246221"/>
           </a:xfrm>
           <a:prstGeom prst="rect">
@@ -8976,24 +8764,24 @@
           <a:noFill/>
         </p:spPr>
         <p:txBody>
-          <a:bodyPr wrap="none" rtlCol="0">
+          <a:bodyPr wrap="square" rtlCol="0">
             <a:spAutoFit/>
           </a:bodyPr>
           <a:lstStyle/>
           <a:p>
             <a:r>
               <a:rPr lang="en-US" sz="1000" dirty="0"/>
-              <a:t>a5</a:t>
-            </a:r>
-          </a:p>
-        </p:txBody>
-      </p:sp>
-      <p:sp>
-        <p:nvSpPr>
-          <p:cNvPr id="365" name="Rectangle 364">
-            <a:extLst>
-              <a:ext uri="{FF2B5EF4-FFF2-40B4-BE49-F238E27FC236}">
-                <a16:creationId xmlns:a16="http://schemas.microsoft.com/office/drawing/2014/main" id="{615FE16F-6DBF-824E-953A-4C555042EABA}"/>
+              <a:t>a7</a:t>
+            </a:r>
+          </a:p>
+        </p:txBody>
+      </p:sp>
+      <p:sp>
+        <p:nvSpPr>
+          <p:cNvPr id="369" name="Rectangle 368">
+            <a:extLst>
+              <a:ext uri="{FF2B5EF4-FFF2-40B4-BE49-F238E27FC236}">
+                <a16:creationId xmlns:a16="http://schemas.microsoft.com/office/drawing/2014/main" id="{63C11E02-6D7E-194B-95B6-48AE7B2E6351}"/>
               </a:ext>
             </a:extLst>
           </p:cNvPr>
@@ -9002,7 +8790,7 @@
         </p:nvSpPr>
         <p:spPr>
           <a:xfrm>
-            <a:off x="6057101" y="2400497"/>
+            <a:off x="6619598" y="2916598"/>
             <a:ext cx="45719" cy="246221"/>
           </a:xfrm>
           <a:prstGeom prst="rect">
@@ -9044,10 +8832,10 @@
       </p:sp>
       <p:sp>
         <p:nvSpPr>
-          <p:cNvPr id="366" name="TextBox 365">
-            <a:extLst>
-              <a:ext uri="{FF2B5EF4-FFF2-40B4-BE49-F238E27FC236}">
-                <a16:creationId xmlns:a16="http://schemas.microsoft.com/office/drawing/2014/main" id="{5E310240-4F39-DC49-BCC4-590DA821005C}"/>
+          <p:cNvPr id="378" name="TextBox 377">
+            <a:extLst>
+              <a:ext uri="{FF2B5EF4-FFF2-40B4-BE49-F238E27FC236}">
+                <a16:creationId xmlns:a16="http://schemas.microsoft.com/office/drawing/2014/main" id="{3EBC9ED6-47C4-6E48-BB27-40113CCC4749}"/>
               </a:ext>
             </a:extLst>
           </p:cNvPr>
@@ -9056,7 +8844,7 @@
         </p:nvSpPr>
         <p:spPr>
           <a:xfrm>
-            <a:off x="6322140" y="2653168"/>
+            <a:off x="4894724" y="2402950"/>
             <a:ext cx="311304" cy="246221"/>
           </a:xfrm>
           <a:prstGeom prst="rect">
@@ -9065,24 +8853,24 @@
           <a:noFill/>
         </p:spPr>
         <p:txBody>
-          <a:bodyPr wrap="square" rtlCol="0">
+          <a:bodyPr wrap="none" rtlCol="0">
             <a:spAutoFit/>
           </a:bodyPr>
           <a:lstStyle/>
           <a:p>
             <a:r>
               <a:rPr lang="en-US" sz="1000" dirty="0"/>
-              <a:t>a6</a:t>
-            </a:r>
-          </a:p>
-        </p:txBody>
-      </p:sp>
-      <p:sp>
-        <p:nvSpPr>
-          <p:cNvPr id="367" name="Rectangle 366">
-            <a:extLst>
-              <a:ext uri="{FF2B5EF4-FFF2-40B4-BE49-F238E27FC236}">
-                <a16:creationId xmlns:a16="http://schemas.microsoft.com/office/drawing/2014/main" id="{42672C61-4316-7444-8000-CFDD967C8616}"/>
+              <a:t>a1</a:t>
+            </a:r>
+          </a:p>
+        </p:txBody>
+      </p:sp>
+      <p:sp>
+        <p:nvSpPr>
+          <p:cNvPr id="379" name="Rectangle 378">
+            <a:extLst>
+              <a:ext uri="{FF2B5EF4-FFF2-40B4-BE49-F238E27FC236}">
+                <a16:creationId xmlns:a16="http://schemas.microsoft.com/office/drawing/2014/main" id="{60FF1D8B-E0F6-FF4B-A7E5-67BFBF1258DD}"/>
               </a:ext>
             </a:extLst>
           </p:cNvPr>
@@ -9091,7 +8879,7 @@
         </p:nvSpPr>
         <p:spPr>
           <a:xfrm>
-            <a:off x="6342043" y="2653168"/>
+            <a:off x="4914627" y="2402950"/>
             <a:ext cx="45719" cy="246221"/>
           </a:xfrm>
           <a:prstGeom prst="rect">
@@ -9133,10 +8921,10 @@
       </p:sp>
       <p:sp>
         <p:nvSpPr>
-          <p:cNvPr id="368" name="TextBox 367">
-            <a:extLst>
-              <a:ext uri="{FF2B5EF4-FFF2-40B4-BE49-F238E27FC236}">
-                <a16:creationId xmlns:a16="http://schemas.microsoft.com/office/drawing/2014/main" id="{8C90C624-816C-D84A-8EB4-7C6DB9CF9695}"/>
+          <p:cNvPr id="380" name="TextBox 379">
+            <a:extLst>
+              <a:ext uri="{FF2B5EF4-FFF2-40B4-BE49-F238E27FC236}">
+                <a16:creationId xmlns:a16="http://schemas.microsoft.com/office/drawing/2014/main" id="{16FB370B-FEDB-B747-A51C-F7C685336D63}"/>
               </a:ext>
             </a:extLst>
           </p:cNvPr>
@@ -9145,7 +8933,7 @@
         </p:nvSpPr>
         <p:spPr>
           <a:xfrm>
-            <a:off x="6599695" y="2916598"/>
+            <a:off x="5168042" y="2647147"/>
             <a:ext cx="311304" cy="246221"/>
           </a:xfrm>
           <a:prstGeom prst="rect">
@@ -9154,24 +8942,24 @@
           <a:noFill/>
         </p:spPr>
         <p:txBody>
-          <a:bodyPr wrap="square" rtlCol="0">
+          <a:bodyPr wrap="none" rtlCol="0">
             <a:spAutoFit/>
           </a:bodyPr>
           <a:lstStyle/>
           <a:p>
             <a:r>
               <a:rPr lang="en-US" sz="1000" dirty="0"/>
-              <a:t>a7</a:t>
-            </a:r>
-          </a:p>
-        </p:txBody>
-      </p:sp>
-      <p:sp>
-        <p:nvSpPr>
-          <p:cNvPr id="369" name="Rectangle 368">
-            <a:extLst>
-              <a:ext uri="{FF2B5EF4-FFF2-40B4-BE49-F238E27FC236}">
-                <a16:creationId xmlns:a16="http://schemas.microsoft.com/office/drawing/2014/main" id="{63C11E02-6D7E-194B-95B6-48AE7B2E6351}"/>
+              <a:t>a2</a:t>
+            </a:r>
+          </a:p>
+        </p:txBody>
+      </p:sp>
+      <p:sp>
+        <p:nvSpPr>
+          <p:cNvPr id="381" name="Rectangle 380">
+            <a:extLst>
+              <a:ext uri="{FF2B5EF4-FFF2-40B4-BE49-F238E27FC236}">
+                <a16:creationId xmlns:a16="http://schemas.microsoft.com/office/drawing/2014/main" id="{52CC06D2-365D-774A-8D67-9335267D3E1C}"/>
               </a:ext>
             </a:extLst>
           </p:cNvPr>
@@ -9180,7 +8968,7 @@
         </p:nvSpPr>
         <p:spPr>
           <a:xfrm>
-            <a:off x="6619598" y="2916598"/>
+            <a:off x="5187945" y="2647147"/>
             <a:ext cx="45719" cy="246221"/>
           </a:xfrm>
           <a:prstGeom prst="rect">
@@ -9222,10 +9010,10 @@
       </p:sp>
       <p:sp>
         <p:nvSpPr>
-          <p:cNvPr id="370" name="TextBox 369">
-            <a:extLst>
-              <a:ext uri="{FF2B5EF4-FFF2-40B4-BE49-F238E27FC236}">
-                <a16:creationId xmlns:a16="http://schemas.microsoft.com/office/drawing/2014/main" id="{E2EEE739-F522-D04B-BB2E-57375E05D992}"/>
+          <p:cNvPr id="382" name="TextBox 381">
+            <a:extLst>
+              <a:ext uri="{FF2B5EF4-FFF2-40B4-BE49-F238E27FC236}">
+                <a16:creationId xmlns:a16="http://schemas.microsoft.com/office/drawing/2014/main" id="{7A4CB93B-6712-C448-9D26-FED4FAE6D10D}"/>
               </a:ext>
             </a:extLst>
           </p:cNvPr>
@@ -9234,8 +9022,8 @@
         </p:nvSpPr>
         <p:spPr>
           <a:xfrm>
-            <a:off x="6913373" y="2403279"/>
-            <a:ext cx="317716" cy="246221"/>
+            <a:off x="5466802" y="2897208"/>
+            <a:ext cx="311304" cy="246221"/>
           </a:xfrm>
           <a:prstGeom prst="rect">
             <a:avLst/>
@@ -9250,17 +9038,17 @@
           <a:p>
             <a:r>
               <a:rPr lang="en-US" sz="1000" dirty="0"/>
-              <a:t>b1</a:t>
-            </a:r>
-          </a:p>
-        </p:txBody>
-      </p:sp>
-      <p:sp>
-        <p:nvSpPr>
-          <p:cNvPr id="371" name="Rectangle 370">
-            <a:extLst>
-              <a:ext uri="{FF2B5EF4-FFF2-40B4-BE49-F238E27FC236}">
-                <a16:creationId xmlns:a16="http://schemas.microsoft.com/office/drawing/2014/main" id="{4E725D6C-9823-2048-8E11-992F9EBB542C}"/>
+              <a:t>a3</a:t>
+            </a:r>
+          </a:p>
+        </p:txBody>
+      </p:sp>
+      <p:sp>
+        <p:nvSpPr>
+          <p:cNvPr id="383" name="Rectangle 382">
+            <a:extLst>
+              <a:ext uri="{FF2B5EF4-FFF2-40B4-BE49-F238E27FC236}">
+                <a16:creationId xmlns:a16="http://schemas.microsoft.com/office/drawing/2014/main" id="{EBC394ED-C84F-CA49-872E-3E0DACB4B8E1}"/>
               </a:ext>
             </a:extLst>
           </p:cNvPr>
@@ -9269,363 +9057,7 @@
         </p:nvSpPr>
         <p:spPr>
           <a:xfrm>
-            <a:off x="6933276" y="2403279"/>
-            <a:ext cx="45719" cy="246221"/>
-          </a:xfrm>
-          <a:prstGeom prst="rect">
-            <a:avLst/>
-          </a:prstGeom>
-          <a:solidFill>
-            <a:schemeClr val="accent4">
-              <a:lumMod val="75000"/>
-            </a:schemeClr>
-          </a:solidFill>
-          <a:ln>
-            <a:noFill/>
-          </a:ln>
-        </p:spPr>
-        <p:style>
-          <a:lnRef idx="2">
-            <a:schemeClr val="accent1">
-              <a:shade val="50000"/>
-            </a:schemeClr>
-          </a:lnRef>
-          <a:fillRef idx="1">
-            <a:schemeClr val="accent1"/>
-          </a:fillRef>
-          <a:effectRef idx="0">
-            <a:schemeClr val="accent1"/>
-          </a:effectRef>
-          <a:fontRef idx="minor">
-            <a:schemeClr val="lt1"/>
-          </a:fontRef>
-        </p:style>
-        <p:txBody>
-          <a:bodyPr rtlCol="0" anchor="ctr"/>
-          <a:lstStyle/>
-          <a:p>
-            <a:pPr algn="ctr"/>
-            <a:endParaRPr lang="en-US"/>
-          </a:p>
-        </p:txBody>
-      </p:sp>
-      <p:sp>
-        <p:nvSpPr>
-          <p:cNvPr id="372" name="TextBox 371">
-            <a:extLst>
-              <a:ext uri="{FF2B5EF4-FFF2-40B4-BE49-F238E27FC236}">
-                <a16:creationId xmlns:a16="http://schemas.microsoft.com/office/drawing/2014/main" id="{6FD1FEE1-5078-DC45-9819-A0FFC45FFD12}"/>
-              </a:ext>
-            </a:extLst>
-          </p:cNvPr>
-          <p:cNvSpPr txBox="1"/>
-          <p:nvPr/>
-        </p:nvSpPr>
-        <p:spPr>
-          <a:xfrm>
-            <a:off x="7179519" y="2641126"/>
-            <a:ext cx="317716" cy="246221"/>
-          </a:xfrm>
-          <a:prstGeom prst="rect">
-            <a:avLst/>
-          </a:prstGeom>
-          <a:noFill/>
-        </p:spPr>
-        <p:txBody>
-          <a:bodyPr wrap="none" rtlCol="0">
-            <a:spAutoFit/>
-          </a:bodyPr>
-          <a:lstStyle/>
-          <a:p>
-            <a:r>
-              <a:rPr lang="en-US" sz="1000" dirty="0"/>
-              <a:t>b2</a:t>
-            </a:r>
-          </a:p>
-        </p:txBody>
-      </p:sp>
-      <p:sp>
-        <p:nvSpPr>
-          <p:cNvPr id="373" name="Rectangle 372">
-            <a:extLst>
-              <a:ext uri="{FF2B5EF4-FFF2-40B4-BE49-F238E27FC236}">
-                <a16:creationId xmlns:a16="http://schemas.microsoft.com/office/drawing/2014/main" id="{FD4D08DB-B5D1-274D-9552-AF366DAD22FB}"/>
-              </a:ext>
-            </a:extLst>
-          </p:cNvPr>
-          <p:cNvSpPr/>
-          <p:nvPr/>
-        </p:nvSpPr>
-        <p:spPr>
-          <a:xfrm>
-            <a:off x="7199422" y="2641126"/>
-            <a:ext cx="45719" cy="246221"/>
-          </a:xfrm>
-          <a:prstGeom prst="rect">
-            <a:avLst/>
-          </a:prstGeom>
-          <a:solidFill>
-            <a:schemeClr val="accent4">
-              <a:lumMod val="75000"/>
-            </a:schemeClr>
-          </a:solidFill>
-          <a:ln>
-            <a:noFill/>
-          </a:ln>
-        </p:spPr>
-        <p:style>
-          <a:lnRef idx="2">
-            <a:schemeClr val="accent1">
-              <a:shade val="50000"/>
-            </a:schemeClr>
-          </a:lnRef>
-          <a:fillRef idx="1">
-            <a:schemeClr val="accent1"/>
-          </a:fillRef>
-          <a:effectRef idx="0">
-            <a:schemeClr val="accent1"/>
-          </a:effectRef>
-          <a:fontRef idx="minor">
-            <a:schemeClr val="lt1"/>
-          </a:fontRef>
-        </p:style>
-        <p:txBody>
-          <a:bodyPr rtlCol="0" anchor="ctr"/>
-          <a:lstStyle/>
-          <a:p>
-            <a:pPr algn="ctr"/>
-            <a:endParaRPr lang="en-US"/>
-          </a:p>
-        </p:txBody>
-      </p:sp>
-      <p:sp>
-        <p:nvSpPr>
-          <p:cNvPr id="374" name="TextBox 373">
-            <a:extLst>
-              <a:ext uri="{FF2B5EF4-FFF2-40B4-BE49-F238E27FC236}">
-                <a16:creationId xmlns:a16="http://schemas.microsoft.com/office/drawing/2014/main" id="{4DB7B386-884A-1A42-B943-A5B2C50C600A}"/>
-              </a:ext>
-            </a:extLst>
-          </p:cNvPr>
-          <p:cNvSpPr txBox="1"/>
-          <p:nvPr/>
-        </p:nvSpPr>
-        <p:spPr>
-          <a:xfrm>
-            <a:off x="7478279" y="2891187"/>
-            <a:ext cx="317716" cy="246221"/>
-          </a:xfrm>
-          <a:prstGeom prst="rect">
-            <a:avLst/>
-          </a:prstGeom>
-          <a:noFill/>
-        </p:spPr>
-        <p:txBody>
-          <a:bodyPr wrap="none" rtlCol="0">
-            <a:spAutoFit/>
-          </a:bodyPr>
-          <a:lstStyle/>
-          <a:p>
-            <a:r>
-              <a:rPr lang="en-US" sz="1000" dirty="0"/>
-              <a:t>b3</a:t>
-            </a:r>
-          </a:p>
-        </p:txBody>
-      </p:sp>
-      <p:sp>
-        <p:nvSpPr>
-          <p:cNvPr id="375" name="Rectangle 374">
-            <a:extLst>
-              <a:ext uri="{FF2B5EF4-FFF2-40B4-BE49-F238E27FC236}">
-                <a16:creationId xmlns:a16="http://schemas.microsoft.com/office/drawing/2014/main" id="{5EB6F7FD-3A14-1E4E-A2C5-866E0120FCD9}"/>
-              </a:ext>
-            </a:extLst>
-          </p:cNvPr>
-          <p:cNvSpPr/>
-          <p:nvPr/>
-        </p:nvSpPr>
-        <p:spPr>
-          <a:xfrm>
-            <a:off x="7498182" y="2891187"/>
-            <a:ext cx="45719" cy="246221"/>
-          </a:xfrm>
-          <a:prstGeom prst="rect">
-            <a:avLst/>
-          </a:prstGeom>
-          <a:solidFill>
-            <a:schemeClr val="accent4">
-              <a:lumMod val="75000"/>
-            </a:schemeClr>
-          </a:solidFill>
-          <a:ln>
-            <a:noFill/>
-          </a:ln>
-        </p:spPr>
-        <p:style>
-          <a:lnRef idx="2">
-            <a:schemeClr val="accent1">
-              <a:shade val="50000"/>
-            </a:schemeClr>
-          </a:lnRef>
-          <a:fillRef idx="1">
-            <a:schemeClr val="accent1"/>
-          </a:fillRef>
-          <a:effectRef idx="0">
-            <a:schemeClr val="accent1"/>
-          </a:effectRef>
-          <a:fontRef idx="minor">
-            <a:schemeClr val="lt1"/>
-          </a:fontRef>
-        </p:style>
-        <p:txBody>
-          <a:bodyPr rtlCol="0" anchor="ctr"/>
-          <a:lstStyle/>
-          <a:p>
-            <a:pPr algn="ctr"/>
-            <a:endParaRPr lang="en-US"/>
-          </a:p>
-        </p:txBody>
-      </p:sp>
-      <p:sp>
-        <p:nvSpPr>
-          <p:cNvPr id="376" name="TextBox 375">
-            <a:extLst>
-              <a:ext uri="{FF2B5EF4-FFF2-40B4-BE49-F238E27FC236}">
-                <a16:creationId xmlns:a16="http://schemas.microsoft.com/office/drawing/2014/main" id="{8ED62B70-DB46-5B42-A40B-43681BA1443B}"/>
-              </a:ext>
-            </a:extLst>
-          </p:cNvPr>
-          <p:cNvSpPr txBox="1"/>
-          <p:nvPr/>
-        </p:nvSpPr>
-        <p:spPr>
-          <a:xfrm>
-            <a:off x="7772562" y="3131386"/>
-            <a:ext cx="317716" cy="246221"/>
-          </a:xfrm>
-          <a:prstGeom prst="rect">
-            <a:avLst/>
-          </a:prstGeom>
-          <a:noFill/>
-        </p:spPr>
-        <p:txBody>
-          <a:bodyPr wrap="none" rtlCol="0">
-            <a:spAutoFit/>
-          </a:bodyPr>
-          <a:lstStyle/>
-          <a:p>
-            <a:r>
-              <a:rPr lang="en-US" sz="1000" dirty="0"/>
-              <a:t>b4</a:t>
-            </a:r>
-          </a:p>
-        </p:txBody>
-      </p:sp>
-      <p:sp>
-        <p:nvSpPr>
-          <p:cNvPr id="377" name="Rectangle 376">
-            <a:extLst>
-              <a:ext uri="{FF2B5EF4-FFF2-40B4-BE49-F238E27FC236}">
-                <a16:creationId xmlns:a16="http://schemas.microsoft.com/office/drawing/2014/main" id="{429B7B58-FDB6-734D-9B2D-55B9F636998B}"/>
-              </a:ext>
-            </a:extLst>
-          </p:cNvPr>
-          <p:cNvSpPr/>
-          <p:nvPr/>
-        </p:nvSpPr>
-        <p:spPr>
-          <a:xfrm>
-            <a:off x="7792465" y="3131386"/>
-            <a:ext cx="45719" cy="246221"/>
-          </a:xfrm>
-          <a:prstGeom prst="rect">
-            <a:avLst/>
-          </a:prstGeom>
-          <a:solidFill>
-            <a:schemeClr val="accent4">
-              <a:lumMod val="75000"/>
-            </a:schemeClr>
-          </a:solidFill>
-          <a:ln>
-            <a:noFill/>
-          </a:ln>
-        </p:spPr>
-        <p:style>
-          <a:lnRef idx="2">
-            <a:schemeClr val="accent1">
-              <a:shade val="50000"/>
-            </a:schemeClr>
-          </a:lnRef>
-          <a:fillRef idx="1">
-            <a:schemeClr val="accent1"/>
-          </a:fillRef>
-          <a:effectRef idx="0">
-            <a:schemeClr val="accent1"/>
-          </a:effectRef>
-          <a:fontRef idx="minor">
-            <a:schemeClr val="lt1"/>
-          </a:fontRef>
-        </p:style>
-        <p:txBody>
-          <a:bodyPr rtlCol="0" anchor="ctr"/>
-          <a:lstStyle/>
-          <a:p>
-            <a:pPr algn="ctr"/>
-            <a:endParaRPr lang="en-US"/>
-          </a:p>
-        </p:txBody>
-      </p:sp>
-      <p:sp>
-        <p:nvSpPr>
-          <p:cNvPr id="378" name="TextBox 377">
-            <a:extLst>
-              <a:ext uri="{FF2B5EF4-FFF2-40B4-BE49-F238E27FC236}">
-                <a16:creationId xmlns:a16="http://schemas.microsoft.com/office/drawing/2014/main" id="{3EBC9ED6-47C4-6E48-BB27-40113CCC4749}"/>
-              </a:ext>
-            </a:extLst>
-          </p:cNvPr>
-          <p:cNvSpPr txBox="1"/>
-          <p:nvPr/>
-        </p:nvSpPr>
-        <p:spPr>
-          <a:xfrm>
-            <a:off x="4894724" y="2402950"/>
-            <a:ext cx="311304" cy="246221"/>
-          </a:xfrm>
-          <a:prstGeom prst="rect">
-            <a:avLst/>
-          </a:prstGeom>
-          <a:noFill/>
-        </p:spPr>
-        <p:txBody>
-          <a:bodyPr wrap="none" rtlCol="0">
-            <a:spAutoFit/>
-          </a:bodyPr>
-          <a:lstStyle/>
-          <a:p>
-            <a:r>
-              <a:rPr lang="en-US" sz="1000" dirty="0"/>
-              <a:t>a1</a:t>
-            </a:r>
-          </a:p>
-        </p:txBody>
-      </p:sp>
-      <p:sp>
-        <p:nvSpPr>
-          <p:cNvPr id="379" name="Rectangle 378">
-            <a:extLst>
-              <a:ext uri="{FF2B5EF4-FFF2-40B4-BE49-F238E27FC236}">
-                <a16:creationId xmlns:a16="http://schemas.microsoft.com/office/drawing/2014/main" id="{60FF1D8B-E0F6-FF4B-A7E5-67BFBF1258DD}"/>
-              </a:ext>
-            </a:extLst>
-          </p:cNvPr>
-          <p:cNvSpPr/>
-          <p:nvPr/>
-        </p:nvSpPr>
-        <p:spPr>
-          <a:xfrm>
-            <a:off x="4914627" y="2402950"/>
+            <a:off x="5486705" y="2897208"/>
             <a:ext cx="45719" cy="246221"/>
           </a:xfrm>
           <a:prstGeom prst="rect">
@@ -9635,271 +9067,6 @@
             <a:schemeClr val="accent2">
               <a:lumMod val="75000"/>
             </a:schemeClr>
-          </a:solidFill>
-          <a:ln>
-            <a:noFill/>
-          </a:ln>
-        </p:spPr>
-        <p:style>
-          <a:lnRef idx="2">
-            <a:schemeClr val="accent1">
-              <a:shade val="50000"/>
-            </a:schemeClr>
-          </a:lnRef>
-          <a:fillRef idx="1">
-            <a:schemeClr val="accent1"/>
-          </a:fillRef>
-          <a:effectRef idx="0">
-            <a:schemeClr val="accent1"/>
-          </a:effectRef>
-          <a:fontRef idx="minor">
-            <a:schemeClr val="lt1"/>
-          </a:fontRef>
-        </p:style>
-        <p:txBody>
-          <a:bodyPr rtlCol="0" anchor="ctr"/>
-          <a:lstStyle/>
-          <a:p>
-            <a:pPr algn="ctr"/>
-            <a:endParaRPr lang="en-US"/>
-          </a:p>
-        </p:txBody>
-      </p:sp>
-      <p:sp>
-        <p:nvSpPr>
-          <p:cNvPr id="380" name="TextBox 379">
-            <a:extLst>
-              <a:ext uri="{FF2B5EF4-FFF2-40B4-BE49-F238E27FC236}">
-                <a16:creationId xmlns:a16="http://schemas.microsoft.com/office/drawing/2014/main" id="{16FB370B-FEDB-B747-A51C-F7C685336D63}"/>
-              </a:ext>
-            </a:extLst>
-          </p:cNvPr>
-          <p:cNvSpPr txBox="1"/>
-          <p:nvPr/>
-        </p:nvSpPr>
-        <p:spPr>
-          <a:xfrm>
-            <a:off x="5168042" y="2647147"/>
-            <a:ext cx="311304" cy="246221"/>
-          </a:xfrm>
-          <a:prstGeom prst="rect">
-            <a:avLst/>
-          </a:prstGeom>
-          <a:noFill/>
-        </p:spPr>
-        <p:txBody>
-          <a:bodyPr wrap="none" rtlCol="0">
-            <a:spAutoFit/>
-          </a:bodyPr>
-          <a:lstStyle/>
-          <a:p>
-            <a:r>
-              <a:rPr lang="en-US" sz="1000" dirty="0"/>
-              <a:t>a2</a:t>
-            </a:r>
-          </a:p>
-        </p:txBody>
-      </p:sp>
-      <p:sp>
-        <p:nvSpPr>
-          <p:cNvPr id="381" name="Rectangle 380">
-            <a:extLst>
-              <a:ext uri="{FF2B5EF4-FFF2-40B4-BE49-F238E27FC236}">
-                <a16:creationId xmlns:a16="http://schemas.microsoft.com/office/drawing/2014/main" id="{52CC06D2-365D-774A-8D67-9335267D3E1C}"/>
-              </a:ext>
-            </a:extLst>
-          </p:cNvPr>
-          <p:cNvSpPr/>
-          <p:nvPr/>
-        </p:nvSpPr>
-        <p:spPr>
-          <a:xfrm>
-            <a:off x="5187945" y="2647147"/>
-            <a:ext cx="45719" cy="246221"/>
-          </a:xfrm>
-          <a:prstGeom prst="rect">
-            <a:avLst/>
-          </a:prstGeom>
-          <a:solidFill>
-            <a:schemeClr val="accent2">
-              <a:lumMod val="75000"/>
-            </a:schemeClr>
-          </a:solidFill>
-          <a:ln>
-            <a:noFill/>
-          </a:ln>
-        </p:spPr>
-        <p:style>
-          <a:lnRef idx="2">
-            <a:schemeClr val="accent1">
-              <a:shade val="50000"/>
-            </a:schemeClr>
-          </a:lnRef>
-          <a:fillRef idx="1">
-            <a:schemeClr val="accent1"/>
-          </a:fillRef>
-          <a:effectRef idx="0">
-            <a:schemeClr val="accent1"/>
-          </a:effectRef>
-          <a:fontRef idx="minor">
-            <a:schemeClr val="lt1"/>
-          </a:fontRef>
-        </p:style>
-        <p:txBody>
-          <a:bodyPr rtlCol="0" anchor="ctr"/>
-          <a:lstStyle/>
-          <a:p>
-            <a:pPr algn="ctr"/>
-            <a:endParaRPr lang="en-US"/>
-          </a:p>
-        </p:txBody>
-      </p:sp>
-      <p:sp>
-        <p:nvSpPr>
-          <p:cNvPr id="382" name="TextBox 381">
-            <a:extLst>
-              <a:ext uri="{FF2B5EF4-FFF2-40B4-BE49-F238E27FC236}">
-                <a16:creationId xmlns:a16="http://schemas.microsoft.com/office/drawing/2014/main" id="{7A4CB93B-6712-C448-9D26-FED4FAE6D10D}"/>
-              </a:ext>
-            </a:extLst>
-          </p:cNvPr>
-          <p:cNvSpPr txBox="1"/>
-          <p:nvPr/>
-        </p:nvSpPr>
-        <p:spPr>
-          <a:xfrm>
-            <a:off x="5466802" y="2897208"/>
-            <a:ext cx="311304" cy="246221"/>
-          </a:xfrm>
-          <a:prstGeom prst="rect">
-            <a:avLst/>
-          </a:prstGeom>
-          <a:noFill/>
-        </p:spPr>
-        <p:txBody>
-          <a:bodyPr wrap="none" rtlCol="0">
-            <a:spAutoFit/>
-          </a:bodyPr>
-          <a:lstStyle/>
-          <a:p>
-            <a:r>
-              <a:rPr lang="en-US" sz="1000" dirty="0"/>
-              <a:t>a3</a:t>
-            </a:r>
-          </a:p>
-        </p:txBody>
-      </p:sp>
-      <p:sp>
-        <p:nvSpPr>
-          <p:cNvPr id="383" name="Rectangle 382">
-            <a:extLst>
-              <a:ext uri="{FF2B5EF4-FFF2-40B4-BE49-F238E27FC236}">
-                <a16:creationId xmlns:a16="http://schemas.microsoft.com/office/drawing/2014/main" id="{EBC394ED-C84F-CA49-872E-3E0DACB4B8E1}"/>
-              </a:ext>
-            </a:extLst>
-          </p:cNvPr>
-          <p:cNvSpPr/>
-          <p:nvPr/>
-        </p:nvSpPr>
-        <p:spPr>
-          <a:xfrm>
-            <a:off x="5486705" y="2897208"/>
-            <a:ext cx="45719" cy="246221"/>
-          </a:xfrm>
-          <a:prstGeom prst="rect">
-            <a:avLst/>
-          </a:prstGeom>
-          <a:solidFill>
-            <a:schemeClr val="accent2">
-              <a:lumMod val="75000"/>
-            </a:schemeClr>
-          </a:solidFill>
-          <a:ln>
-            <a:noFill/>
-          </a:ln>
-        </p:spPr>
-        <p:style>
-          <a:lnRef idx="2">
-            <a:schemeClr val="accent1">
-              <a:shade val="50000"/>
-            </a:schemeClr>
-          </a:lnRef>
-          <a:fillRef idx="1">
-            <a:schemeClr val="accent1"/>
-          </a:fillRef>
-          <a:effectRef idx="0">
-            <a:schemeClr val="accent1"/>
-          </a:effectRef>
-          <a:fontRef idx="minor">
-            <a:schemeClr val="lt1"/>
-          </a:fontRef>
-        </p:style>
-        <p:txBody>
-          <a:bodyPr rtlCol="0" anchor="ctr"/>
-          <a:lstStyle/>
-          <a:p>
-            <a:pPr algn="ctr"/>
-            <a:endParaRPr lang="en-US"/>
-          </a:p>
-        </p:txBody>
-      </p:sp>
-      <p:sp>
-        <p:nvSpPr>
-          <p:cNvPr id="385" name="TextBox 384">
-            <a:extLst>
-              <a:ext uri="{FF2B5EF4-FFF2-40B4-BE49-F238E27FC236}">
-                <a16:creationId xmlns:a16="http://schemas.microsoft.com/office/drawing/2014/main" id="{1593B82E-F32D-7540-A5FA-EAB48328D1BD}"/>
-              </a:ext>
-            </a:extLst>
-          </p:cNvPr>
-          <p:cNvSpPr txBox="1"/>
-          <p:nvPr/>
-        </p:nvSpPr>
-        <p:spPr>
-          <a:xfrm>
-            <a:off x="11523752" y="3646825"/>
-            <a:ext cx="346827" cy="246221"/>
-          </a:xfrm>
-          <a:prstGeom prst="rect">
-            <a:avLst/>
-          </a:prstGeom>
-          <a:noFill/>
-        </p:spPr>
-        <p:txBody>
-          <a:bodyPr wrap="square" rtlCol="0">
-            <a:spAutoFit/>
-          </a:bodyPr>
-          <a:lstStyle/>
-          <a:p>
-            <a:r>
-              <a:rPr lang="en-US" sz="1000" dirty="0"/>
-              <a:t>rc1</a:t>
-            </a:r>
-          </a:p>
-        </p:txBody>
-      </p:sp>
-      <p:sp>
-        <p:nvSpPr>
-          <p:cNvPr id="386" name="Rectangle 385">
-            <a:extLst>
-              <a:ext uri="{FF2B5EF4-FFF2-40B4-BE49-F238E27FC236}">
-                <a16:creationId xmlns:a16="http://schemas.microsoft.com/office/drawing/2014/main" id="{B0D12A25-C6EF-0544-AA9B-3343FF30AAC6}"/>
-              </a:ext>
-            </a:extLst>
-          </p:cNvPr>
-          <p:cNvSpPr/>
-          <p:nvPr/>
-        </p:nvSpPr>
-        <p:spPr>
-          <a:xfrm>
-            <a:off x="11534081" y="3646825"/>
-            <a:ext cx="45719" cy="246221"/>
-          </a:xfrm>
-          <a:prstGeom prst="rect">
-            <a:avLst/>
-          </a:prstGeom>
-          <a:solidFill>
-            <a:schemeClr val="accent4"/>
           </a:solidFill>
           <a:ln>
             <a:noFill/>
@@ -10024,10 +9191,10 @@
       </p:sp>
       <p:sp>
         <p:nvSpPr>
-          <p:cNvPr id="389" name="TextBox 388">
-            <a:extLst>
-              <a:ext uri="{FF2B5EF4-FFF2-40B4-BE49-F238E27FC236}">
-                <a16:creationId xmlns:a16="http://schemas.microsoft.com/office/drawing/2014/main" id="{15905899-4129-A64D-8C3D-C91D7924324C}"/>
+          <p:cNvPr id="391" name="TextBox 390">
+            <a:extLst>
+              <a:ext uri="{FF2B5EF4-FFF2-40B4-BE49-F238E27FC236}">
+                <a16:creationId xmlns:a16="http://schemas.microsoft.com/office/drawing/2014/main" id="{01305373-C7EF-0348-B9C6-B64205416413}"/>
               </a:ext>
             </a:extLst>
           </p:cNvPr>
@@ -10036,8 +9203,8 @@
         </p:nvSpPr>
         <p:spPr>
           <a:xfrm>
-            <a:off x="11568243" y="3888244"/>
-            <a:ext cx="349776" cy="246221"/>
+            <a:off x="9222284" y="4386810"/>
+            <a:ext cx="311304" cy="246221"/>
           </a:xfrm>
           <a:prstGeom prst="rect">
             <a:avLst/>
@@ -10052,93 +9219,6 @@
           <a:p>
             <a:r>
               <a:rPr lang="en-US" sz="1000" dirty="0"/>
-              <a:t>rc2</a:t>
-            </a:r>
-          </a:p>
-        </p:txBody>
-      </p:sp>
-      <p:sp>
-        <p:nvSpPr>
-          <p:cNvPr id="390" name="Rectangle 389">
-            <a:extLst>
-              <a:ext uri="{FF2B5EF4-FFF2-40B4-BE49-F238E27FC236}">
-                <a16:creationId xmlns:a16="http://schemas.microsoft.com/office/drawing/2014/main" id="{854A60F7-EA2B-C141-A709-84595D04CE74}"/>
-              </a:ext>
-            </a:extLst>
-          </p:cNvPr>
-          <p:cNvSpPr/>
-          <p:nvPr/>
-        </p:nvSpPr>
-        <p:spPr>
-          <a:xfrm>
-            <a:off x="11593122" y="3891419"/>
-            <a:ext cx="45719" cy="246221"/>
-          </a:xfrm>
-          <a:prstGeom prst="rect">
-            <a:avLst/>
-          </a:prstGeom>
-          <a:solidFill>
-            <a:schemeClr val="accent4"/>
-          </a:solidFill>
-          <a:ln>
-            <a:noFill/>
-          </a:ln>
-        </p:spPr>
-        <p:style>
-          <a:lnRef idx="2">
-            <a:schemeClr val="accent1">
-              <a:shade val="50000"/>
-            </a:schemeClr>
-          </a:lnRef>
-          <a:fillRef idx="1">
-            <a:schemeClr val="accent1"/>
-          </a:fillRef>
-          <a:effectRef idx="0">
-            <a:schemeClr val="accent1"/>
-          </a:effectRef>
-          <a:fontRef idx="minor">
-            <a:schemeClr val="lt1"/>
-          </a:fontRef>
-        </p:style>
-        <p:txBody>
-          <a:bodyPr rtlCol="0" anchor="ctr"/>
-          <a:lstStyle/>
-          <a:p>
-            <a:pPr algn="ctr"/>
-            <a:endParaRPr lang="en-US"/>
-          </a:p>
-        </p:txBody>
-      </p:sp>
-      <p:sp>
-        <p:nvSpPr>
-          <p:cNvPr id="391" name="TextBox 390">
-            <a:extLst>
-              <a:ext uri="{FF2B5EF4-FFF2-40B4-BE49-F238E27FC236}">
-                <a16:creationId xmlns:a16="http://schemas.microsoft.com/office/drawing/2014/main" id="{01305373-C7EF-0348-B9C6-B64205416413}"/>
-              </a:ext>
-            </a:extLst>
-          </p:cNvPr>
-          <p:cNvSpPr txBox="1"/>
-          <p:nvPr/>
-        </p:nvSpPr>
-        <p:spPr>
-          <a:xfrm>
-            <a:off x="9222284" y="4386810"/>
-            <a:ext cx="311304" cy="246221"/>
-          </a:xfrm>
-          <a:prstGeom prst="rect">
-            <a:avLst/>
-          </a:prstGeom>
-          <a:noFill/>
-        </p:spPr>
-        <p:txBody>
-          <a:bodyPr wrap="none" rtlCol="0">
-            <a:spAutoFit/>
-          </a:bodyPr>
-          <a:lstStyle/>
-          <a:p>
-            <a:r>
-              <a:rPr lang="en-US" sz="1000" dirty="0"/>
               <a:t>a4</a:t>
             </a:r>
           </a:p>
@@ -10166,362 +9246,6 @@
           </a:prstGeom>
           <a:solidFill>
             <a:schemeClr val="accent2">
-              <a:lumMod val="75000"/>
-            </a:schemeClr>
-          </a:solidFill>
-          <a:ln>
-            <a:noFill/>
-          </a:ln>
-        </p:spPr>
-        <p:style>
-          <a:lnRef idx="2">
-            <a:schemeClr val="accent1">
-              <a:shade val="50000"/>
-            </a:schemeClr>
-          </a:lnRef>
-          <a:fillRef idx="1">
-            <a:schemeClr val="accent1"/>
-          </a:fillRef>
-          <a:effectRef idx="0">
-            <a:schemeClr val="accent1"/>
-          </a:effectRef>
-          <a:fontRef idx="minor">
-            <a:schemeClr val="lt1"/>
-          </a:fontRef>
-        </p:style>
-        <p:txBody>
-          <a:bodyPr rtlCol="0" anchor="ctr"/>
-          <a:lstStyle/>
-          <a:p>
-            <a:pPr algn="ctr"/>
-            <a:endParaRPr lang="en-US"/>
-          </a:p>
-        </p:txBody>
-      </p:sp>
-      <p:sp>
-        <p:nvSpPr>
-          <p:cNvPr id="399" name="TextBox 398">
-            <a:extLst>
-              <a:ext uri="{FF2B5EF4-FFF2-40B4-BE49-F238E27FC236}">
-                <a16:creationId xmlns:a16="http://schemas.microsoft.com/office/drawing/2014/main" id="{DC7ABF65-2F7F-254C-977E-E4A0985F2EA9}"/>
-              </a:ext>
-            </a:extLst>
-          </p:cNvPr>
-          <p:cNvSpPr txBox="1"/>
-          <p:nvPr/>
-        </p:nvSpPr>
-        <p:spPr>
-          <a:xfrm>
-            <a:off x="10364667" y="3647154"/>
-            <a:ext cx="317716" cy="246221"/>
-          </a:xfrm>
-          <a:prstGeom prst="rect">
-            <a:avLst/>
-          </a:prstGeom>
-          <a:noFill/>
-        </p:spPr>
-        <p:txBody>
-          <a:bodyPr wrap="none" rtlCol="0">
-            <a:spAutoFit/>
-          </a:bodyPr>
-          <a:lstStyle/>
-          <a:p>
-            <a:r>
-              <a:rPr lang="en-US" sz="1000" dirty="0"/>
-              <a:t>b1</a:t>
-            </a:r>
-          </a:p>
-        </p:txBody>
-      </p:sp>
-      <p:sp>
-        <p:nvSpPr>
-          <p:cNvPr id="400" name="Rectangle 399">
-            <a:extLst>
-              <a:ext uri="{FF2B5EF4-FFF2-40B4-BE49-F238E27FC236}">
-                <a16:creationId xmlns:a16="http://schemas.microsoft.com/office/drawing/2014/main" id="{266E3CE2-5A38-F149-8FE0-D2A419704120}"/>
-              </a:ext>
-            </a:extLst>
-          </p:cNvPr>
-          <p:cNvSpPr/>
-          <p:nvPr/>
-        </p:nvSpPr>
-        <p:spPr>
-          <a:xfrm>
-            <a:off x="10384570" y="3647154"/>
-            <a:ext cx="45719" cy="246221"/>
-          </a:xfrm>
-          <a:prstGeom prst="rect">
-            <a:avLst/>
-          </a:prstGeom>
-          <a:solidFill>
-            <a:schemeClr val="accent4">
-              <a:lumMod val="75000"/>
-            </a:schemeClr>
-          </a:solidFill>
-          <a:ln>
-            <a:noFill/>
-          </a:ln>
-        </p:spPr>
-        <p:style>
-          <a:lnRef idx="2">
-            <a:schemeClr val="accent1">
-              <a:shade val="50000"/>
-            </a:schemeClr>
-          </a:lnRef>
-          <a:fillRef idx="1">
-            <a:schemeClr val="accent1"/>
-          </a:fillRef>
-          <a:effectRef idx="0">
-            <a:schemeClr val="accent1"/>
-          </a:effectRef>
-          <a:fontRef idx="minor">
-            <a:schemeClr val="lt1"/>
-          </a:fontRef>
-        </p:style>
-        <p:txBody>
-          <a:bodyPr rtlCol="0" anchor="ctr"/>
-          <a:lstStyle/>
-          <a:p>
-            <a:pPr algn="ctr"/>
-            <a:endParaRPr lang="en-US"/>
-          </a:p>
-        </p:txBody>
-      </p:sp>
-      <p:sp>
-        <p:nvSpPr>
-          <p:cNvPr id="401" name="TextBox 400">
-            <a:extLst>
-              <a:ext uri="{FF2B5EF4-FFF2-40B4-BE49-F238E27FC236}">
-                <a16:creationId xmlns:a16="http://schemas.microsoft.com/office/drawing/2014/main" id="{70E914F3-8830-1649-86F4-736336D51305}"/>
-              </a:ext>
-            </a:extLst>
-          </p:cNvPr>
-          <p:cNvSpPr txBox="1"/>
-          <p:nvPr/>
-        </p:nvSpPr>
-        <p:spPr>
-          <a:xfrm>
-            <a:off x="10640718" y="3890529"/>
-            <a:ext cx="317716" cy="246221"/>
-          </a:xfrm>
-          <a:prstGeom prst="rect">
-            <a:avLst/>
-          </a:prstGeom>
-          <a:noFill/>
-        </p:spPr>
-        <p:txBody>
-          <a:bodyPr wrap="none" rtlCol="0">
-            <a:spAutoFit/>
-          </a:bodyPr>
-          <a:lstStyle/>
-          <a:p>
-            <a:r>
-              <a:rPr lang="en-US" sz="1000" dirty="0"/>
-              <a:t>b2</a:t>
-            </a:r>
-          </a:p>
-        </p:txBody>
-      </p:sp>
-      <p:sp>
-        <p:nvSpPr>
-          <p:cNvPr id="402" name="Rectangle 401">
-            <a:extLst>
-              <a:ext uri="{FF2B5EF4-FFF2-40B4-BE49-F238E27FC236}">
-                <a16:creationId xmlns:a16="http://schemas.microsoft.com/office/drawing/2014/main" id="{B0DBEEDB-45EB-6C40-84B9-A296406608DD}"/>
-              </a:ext>
-            </a:extLst>
-          </p:cNvPr>
-          <p:cNvSpPr/>
-          <p:nvPr/>
-        </p:nvSpPr>
-        <p:spPr>
-          <a:xfrm>
-            <a:off x="10660621" y="3890529"/>
-            <a:ext cx="45719" cy="246221"/>
-          </a:xfrm>
-          <a:prstGeom prst="rect">
-            <a:avLst/>
-          </a:prstGeom>
-          <a:solidFill>
-            <a:schemeClr val="accent4">
-              <a:lumMod val="75000"/>
-            </a:schemeClr>
-          </a:solidFill>
-          <a:ln>
-            <a:noFill/>
-          </a:ln>
-        </p:spPr>
-        <p:style>
-          <a:lnRef idx="2">
-            <a:schemeClr val="accent1">
-              <a:shade val="50000"/>
-            </a:schemeClr>
-          </a:lnRef>
-          <a:fillRef idx="1">
-            <a:schemeClr val="accent1"/>
-          </a:fillRef>
-          <a:effectRef idx="0">
-            <a:schemeClr val="accent1"/>
-          </a:effectRef>
-          <a:fontRef idx="minor">
-            <a:schemeClr val="lt1"/>
-          </a:fontRef>
-        </p:style>
-        <p:txBody>
-          <a:bodyPr rtlCol="0" anchor="ctr"/>
-          <a:lstStyle/>
-          <a:p>
-            <a:pPr algn="ctr"/>
-            <a:endParaRPr lang="en-US"/>
-          </a:p>
-        </p:txBody>
-      </p:sp>
-      <p:sp>
-        <p:nvSpPr>
-          <p:cNvPr id="403" name="TextBox 402">
-            <a:extLst>
-              <a:ext uri="{FF2B5EF4-FFF2-40B4-BE49-F238E27FC236}">
-                <a16:creationId xmlns:a16="http://schemas.microsoft.com/office/drawing/2014/main" id="{6A841CD3-AFEA-8847-9BEE-11894198CD7E}"/>
-              </a:ext>
-            </a:extLst>
-          </p:cNvPr>
-          <p:cNvSpPr txBox="1"/>
-          <p:nvPr/>
-        </p:nvSpPr>
-        <p:spPr>
-          <a:xfrm>
-            <a:off x="10928326" y="4140590"/>
-            <a:ext cx="317716" cy="246221"/>
-          </a:xfrm>
-          <a:prstGeom prst="rect">
-            <a:avLst/>
-          </a:prstGeom>
-          <a:noFill/>
-        </p:spPr>
-        <p:txBody>
-          <a:bodyPr wrap="none" rtlCol="0">
-            <a:spAutoFit/>
-          </a:bodyPr>
-          <a:lstStyle/>
-          <a:p>
-            <a:r>
-              <a:rPr lang="en-US" sz="1000" dirty="0"/>
-              <a:t>b3</a:t>
-            </a:r>
-          </a:p>
-        </p:txBody>
-      </p:sp>
-      <p:sp>
-        <p:nvSpPr>
-          <p:cNvPr id="404" name="Rectangle 403">
-            <a:extLst>
-              <a:ext uri="{FF2B5EF4-FFF2-40B4-BE49-F238E27FC236}">
-                <a16:creationId xmlns:a16="http://schemas.microsoft.com/office/drawing/2014/main" id="{720B9F53-72A4-6443-9997-6C9D2C509020}"/>
-              </a:ext>
-            </a:extLst>
-          </p:cNvPr>
-          <p:cNvSpPr/>
-          <p:nvPr/>
-        </p:nvSpPr>
-        <p:spPr>
-          <a:xfrm>
-            <a:off x="10948229" y="4140590"/>
-            <a:ext cx="45719" cy="246221"/>
-          </a:xfrm>
-          <a:prstGeom prst="rect">
-            <a:avLst/>
-          </a:prstGeom>
-          <a:solidFill>
-            <a:schemeClr val="accent4">
-              <a:lumMod val="75000"/>
-            </a:schemeClr>
-          </a:solidFill>
-          <a:ln>
-            <a:noFill/>
-          </a:ln>
-        </p:spPr>
-        <p:style>
-          <a:lnRef idx="2">
-            <a:schemeClr val="accent1">
-              <a:shade val="50000"/>
-            </a:schemeClr>
-          </a:lnRef>
-          <a:fillRef idx="1">
-            <a:schemeClr val="accent1"/>
-          </a:fillRef>
-          <a:effectRef idx="0">
-            <a:schemeClr val="accent1"/>
-          </a:effectRef>
-          <a:fontRef idx="minor">
-            <a:schemeClr val="lt1"/>
-          </a:fontRef>
-        </p:style>
-        <p:txBody>
-          <a:bodyPr rtlCol="0" anchor="ctr"/>
-          <a:lstStyle/>
-          <a:p>
-            <a:pPr algn="ctr"/>
-            <a:endParaRPr lang="en-US"/>
-          </a:p>
-        </p:txBody>
-      </p:sp>
-      <p:sp>
-        <p:nvSpPr>
-          <p:cNvPr id="405" name="TextBox 404">
-            <a:extLst>
-              <a:ext uri="{FF2B5EF4-FFF2-40B4-BE49-F238E27FC236}">
-                <a16:creationId xmlns:a16="http://schemas.microsoft.com/office/drawing/2014/main" id="{ABB4C913-DFF0-C34D-A072-1DDF6509C246}"/>
-              </a:ext>
-            </a:extLst>
-          </p:cNvPr>
-          <p:cNvSpPr txBox="1"/>
-          <p:nvPr/>
-        </p:nvSpPr>
-        <p:spPr>
-          <a:xfrm>
-            <a:off x="11222609" y="4380789"/>
-            <a:ext cx="317716" cy="246221"/>
-          </a:xfrm>
-          <a:prstGeom prst="rect">
-            <a:avLst/>
-          </a:prstGeom>
-          <a:noFill/>
-        </p:spPr>
-        <p:txBody>
-          <a:bodyPr wrap="none" rtlCol="0">
-            <a:spAutoFit/>
-          </a:bodyPr>
-          <a:lstStyle/>
-          <a:p>
-            <a:r>
-              <a:rPr lang="en-US" sz="1000" dirty="0"/>
-              <a:t>b4</a:t>
-            </a:r>
-          </a:p>
-        </p:txBody>
-      </p:sp>
-      <p:sp>
-        <p:nvSpPr>
-          <p:cNvPr id="406" name="Rectangle 405">
-            <a:extLst>
-              <a:ext uri="{FF2B5EF4-FFF2-40B4-BE49-F238E27FC236}">
-                <a16:creationId xmlns:a16="http://schemas.microsoft.com/office/drawing/2014/main" id="{5AC8233A-CA53-FB46-89D2-A3DCA9C1E7A2}"/>
-              </a:ext>
-            </a:extLst>
-          </p:cNvPr>
-          <p:cNvSpPr/>
-          <p:nvPr/>
-        </p:nvSpPr>
-        <p:spPr>
-          <a:xfrm>
-            <a:off x="11242512" y="4371163"/>
-            <a:ext cx="45719" cy="246221"/>
-          </a:xfrm>
-          <a:prstGeom prst="rect">
-            <a:avLst/>
-          </a:prstGeom>
-          <a:solidFill>
-            <a:schemeClr val="accent4">
               <a:lumMod val="75000"/>
             </a:schemeClr>
           </a:solidFill>
@@ -11523,8 +10247,8 @@
         </p:nvSpPr>
         <p:spPr>
           <a:xfrm>
-            <a:off x="3581174" y="808825"/>
-            <a:ext cx="894298" cy="307777"/>
+            <a:off x="3463012" y="808825"/>
+            <a:ext cx="871869" cy="307777"/>
           </a:xfrm>
           <a:prstGeom prst="rect">
             <a:avLst/>
@@ -11559,8 +10283,8 @@
         </p:nvSpPr>
         <p:spPr>
           <a:xfrm>
-            <a:off x="4512506" y="811005"/>
-            <a:ext cx="489458" cy="307777"/>
+            <a:off x="4334881" y="811005"/>
+            <a:ext cx="579717" cy="307777"/>
           </a:xfrm>
           <a:prstGeom prst="rect">
             <a:avLst/>
@@ -14003,6 +12727,1282 @@
           </a:prstGeom>
           <a:solidFill>
             <a:schemeClr val="accent2">
+              <a:lumMod val="75000"/>
+            </a:schemeClr>
+          </a:solidFill>
+          <a:ln>
+            <a:noFill/>
+          </a:ln>
+        </p:spPr>
+        <p:style>
+          <a:lnRef idx="2">
+            <a:schemeClr val="accent1">
+              <a:shade val="50000"/>
+            </a:schemeClr>
+          </a:lnRef>
+          <a:fillRef idx="1">
+            <a:schemeClr val="accent1"/>
+          </a:fillRef>
+          <a:effectRef idx="0">
+            <a:schemeClr val="accent1"/>
+          </a:effectRef>
+          <a:fontRef idx="minor">
+            <a:schemeClr val="lt1"/>
+          </a:fontRef>
+        </p:style>
+        <p:txBody>
+          <a:bodyPr rtlCol="0" anchor="ctr"/>
+          <a:lstStyle/>
+          <a:p>
+            <a:pPr algn="ctr"/>
+            <a:endParaRPr lang="en-US"/>
+          </a:p>
+        </p:txBody>
+      </p:sp>
+      <p:sp>
+        <p:nvSpPr>
+          <p:cNvPr id="279" name="Rectangle 278">
+            <a:extLst>
+              <a:ext uri="{FF2B5EF4-FFF2-40B4-BE49-F238E27FC236}">
+                <a16:creationId xmlns:a16="http://schemas.microsoft.com/office/drawing/2014/main" id="{A5BA2299-988B-244D-8799-8ED00B386700}"/>
+              </a:ext>
+            </a:extLst>
+          </p:cNvPr>
+          <p:cNvSpPr/>
+          <p:nvPr/>
+        </p:nvSpPr>
+        <p:spPr>
+          <a:xfrm>
+            <a:off x="6922961" y="2397551"/>
+            <a:ext cx="864973" cy="975358"/>
+          </a:xfrm>
+          <a:prstGeom prst="rect">
+            <a:avLst/>
+          </a:prstGeom>
+          <a:solidFill>
+            <a:srgbClr val="FFC000">
+              <a:alpha val="50000"/>
+            </a:srgbClr>
+          </a:solidFill>
+          <a:ln>
+            <a:noFill/>
+          </a:ln>
+        </p:spPr>
+        <p:style>
+          <a:lnRef idx="2">
+            <a:schemeClr val="accent1">
+              <a:shade val="50000"/>
+            </a:schemeClr>
+          </a:lnRef>
+          <a:fillRef idx="1">
+            <a:schemeClr val="accent1"/>
+          </a:fillRef>
+          <a:effectRef idx="0">
+            <a:schemeClr val="accent1"/>
+          </a:effectRef>
+          <a:fontRef idx="minor">
+            <a:schemeClr val="lt1"/>
+          </a:fontRef>
+        </p:style>
+        <p:txBody>
+          <a:bodyPr rtlCol="0" anchor="ctr"/>
+          <a:lstStyle/>
+          <a:p>
+            <a:pPr algn="ctr"/>
+            <a:endParaRPr lang="en-US" dirty="0"/>
+          </a:p>
+        </p:txBody>
+      </p:sp>
+      <p:sp>
+        <p:nvSpPr>
+          <p:cNvPr id="280" name="Rectangle 279">
+            <a:extLst>
+              <a:ext uri="{FF2B5EF4-FFF2-40B4-BE49-F238E27FC236}">
+                <a16:creationId xmlns:a16="http://schemas.microsoft.com/office/drawing/2014/main" id="{64A9A17F-D186-E44E-BE8A-E14531B25A32}"/>
+              </a:ext>
+            </a:extLst>
+          </p:cNvPr>
+          <p:cNvSpPr/>
+          <p:nvPr/>
+        </p:nvSpPr>
+        <p:spPr>
+          <a:xfrm>
+            <a:off x="7784139" y="2395519"/>
+            <a:ext cx="594989" cy="977439"/>
+          </a:xfrm>
+          <a:prstGeom prst="rect">
+            <a:avLst/>
+          </a:prstGeom>
+          <a:solidFill>
+            <a:srgbClr val="FFFF00">
+              <a:alpha val="40000"/>
+            </a:srgbClr>
+          </a:solidFill>
+          <a:ln>
+            <a:noFill/>
+          </a:ln>
+        </p:spPr>
+        <p:style>
+          <a:lnRef idx="2">
+            <a:schemeClr val="accent1">
+              <a:shade val="50000"/>
+            </a:schemeClr>
+          </a:lnRef>
+          <a:fillRef idx="1">
+            <a:schemeClr val="accent1"/>
+          </a:fillRef>
+          <a:effectRef idx="0">
+            <a:schemeClr val="accent1"/>
+          </a:effectRef>
+          <a:fontRef idx="minor">
+            <a:schemeClr val="lt1"/>
+          </a:fontRef>
+        </p:style>
+        <p:txBody>
+          <a:bodyPr rtlCol="0" anchor="ctr"/>
+          <a:lstStyle/>
+          <a:p>
+            <a:pPr algn="ctr"/>
+            <a:endParaRPr lang="en-US"/>
+          </a:p>
+        </p:txBody>
+      </p:sp>
+      <p:sp>
+        <p:nvSpPr>
+          <p:cNvPr id="281" name="TextBox 280">
+            <a:extLst>
+              <a:ext uri="{FF2B5EF4-FFF2-40B4-BE49-F238E27FC236}">
+                <a16:creationId xmlns:a16="http://schemas.microsoft.com/office/drawing/2014/main" id="{7A2EB842-18E0-9D44-8FC8-A6B72102D56A}"/>
+              </a:ext>
+            </a:extLst>
+          </p:cNvPr>
+          <p:cNvSpPr txBox="1"/>
+          <p:nvPr/>
+        </p:nvSpPr>
+        <p:spPr>
+          <a:xfrm>
+            <a:off x="7767267" y="2395239"/>
+            <a:ext cx="368039" cy="246221"/>
+          </a:xfrm>
+          <a:prstGeom prst="rect">
+            <a:avLst/>
+          </a:prstGeom>
+          <a:noFill/>
+        </p:spPr>
+        <p:txBody>
+          <a:bodyPr wrap="square" rtlCol="0">
+            <a:spAutoFit/>
+          </a:bodyPr>
+          <a:lstStyle/>
+          <a:p>
+            <a:r>
+              <a:rPr lang="en-US" sz="1000" dirty="0"/>
+              <a:t>rc1</a:t>
+            </a:r>
+          </a:p>
+        </p:txBody>
+      </p:sp>
+      <p:sp>
+        <p:nvSpPr>
+          <p:cNvPr id="282" name="Rectangle 281">
+            <a:extLst>
+              <a:ext uri="{FF2B5EF4-FFF2-40B4-BE49-F238E27FC236}">
+                <a16:creationId xmlns:a16="http://schemas.microsoft.com/office/drawing/2014/main" id="{0265EBBC-0496-F644-B9D8-37F0720F40EE}"/>
+              </a:ext>
+            </a:extLst>
+          </p:cNvPr>
+          <p:cNvSpPr/>
+          <p:nvPr/>
+        </p:nvSpPr>
+        <p:spPr>
+          <a:xfrm>
+            <a:off x="7793947" y="2395239"/>
+            <a:ext cx="48106" cy="246221"/>
+          </a:xfrm>
+          <a:prstGeom prst="rect">
+            <a:avLst/>
+          </a:prstGeom>
+          <a:solidFill>
+            <a:schemeClr val="accent4"/>
+          </a:solidFill>
+          <a:ln>
+            <a:noFill/>
+          </a:ln>
+        </p:spPr>
+        <p:style>
+          <a:lnRef idx="2">
+            <a:schemeClr val="accent1">
+              <a:shade val="50000"/>
+            </a:schemeClr>
+          </a:lnRef>
+          <a:fillRef idx="1">
+            <a:schemeClr val="accent1"/>
+          </a:fillRef>
+          <a:effectRef idx="0">
+            <a:schemeClr val="accent1"/>
+          </a:effectRef>
+          <a:fontRef idx="minor">
+            <a:schemeClr val="lt1"/>
+          </a:fontRef>
+        </p:style>
+        <p:txBody>
+          <a:bodyPr rtlCol="0" anchor="ctr"/>
+          <a:lstStyle/>
+          <a:p>
+            <a:pPr algn="ctr"/>
+            <a:endParaRPr lang="en-US"/>
+          </a:p>
+        </p:txBody>
+      </p:sp>
+      <p:sp>
+        <p:nvSpPr>
+          <p:cNvPr id="283" name="TextBox 282">
+            <a:extLst>
+              <a:ext uri="{FF2B5EF4-FFF2-40B4-BE49-F238E27FC236}">
+                <a16:creationId xmlns:a16="http://schemas.microsoft.com/office/drawing/2014/main" id="{451EED03-214F-A345-B6A0-12C685C418A5}"/>
+              </a:ext>
+            </a:extLst>
+          </p:cNvPr>
+          <p:cNvSpPr txBox="1"/>
+          <p:nvPr/>
+        </p:nvSpPr>
+        <p:spPr>
+          <a:xfrm>
+            <a:off x="8050800" y="2646946"/>
+            <a:ext cx="368039" cy="246221"/>
+          </a:xfrm>
+          <a:prstGeom prst="rect">
+            <a:avLst/>
+          </a:prstGeom>
+          <a:noFill/>
+        </p:spPr>
+        <p:txBody>
+          <a:bodyPr wrap="square" rtlCol="0">
+            <a:spAutoFit/>
+          </a:bodyPr>
+          <a:lstStyle/>
+          <a:p>
+            <a:r>
+              <a:rPr lang="en-US" sz="1000" dirty="0"/>
+              <a:t>rc2</a:t>
+            </a:r>
+          </a:p>
+        </p:txBody>
+      </p:sp>
+      <p:sp>
+        <p:nvSpPr>
+          <p:cNvPr id="329" name="Rectangle 328">
+            <a:extLst>
+              <a:ext uri="{FF2B5EF4-FFF2-40B4-BE49-F238E27FC236}">
+                <a16:creationId xmlns:a16="http://schemas.microsoft.com/office/drawing/2014/main" id="{0E4211EE-8D5B-D34C-8AC2-A1300AE9F8A0}"/>
+              </a:ext>
+            </a:extLst>
+          </p:cNvPr>
+          <p:cNvSpPr/>
+          <p:nvPr/>
+        </p:nvSpPr>
+        <p:spPr>
+          <a:xfrm>
+            <a:off x="8077480" y="2646946"/>
+            <a:ext cx="48106" cy="246221"/>
+          </a:xfrm>
+          <a:prstGeom prst="rect">
+            <a:avLst/>
+          </a:prstGeom>
+          <a:solidFill>
+            <a:schemeClr val="accent4"/>
+          </a:solidFill>
+          <a:ln>
+            <a:noFill/>
+          </a:ln>
+        </p:spPr>
+        <p:style>
+          <a:lnRef idx="2">
+            <a:schemeClr val="accent1">
+              <a:shade val="50000"/>
+            </a:schemeClr>
+          </a:lnRef>
+          <a:fillRef idx="1">
+            <a:schemeClr val="accent1"/>
+          </a:fillRef>
+          <a:effectRef idx="0">
+            <a:schemeClr val="accent1"/>
+          </a:effectRef>
+          <a:fontRef idx="minor">
+            <a:schemeClr val="lt1"/>
+          </a:fontRef>
+        </p:style>
+        <p:txBody>
+          <a:bodyPr rtlCol="0" anchor="ctr"/>
+          <a:lstStyle/>
+          <a:p>
+            <a:pPr algn="ctr"/>
+            <a:endParaRPr lang="en-US"/>
+          </a:p>
+        </p:txBody>
+      </p:sp>
+      <p:sp>
+        <p:nvSpPr>
+          <p:cNvPr id="330" name="TextBox 329">
+            <a:extLst>
+              <a:ext uri="{FF2B5EF4-FFF2-40B4-BE49-F238E27FC236}">
+                <a16:creationId xmlns:a16="http://schemas.microsoft.com/office/drawing/2014/main" id="{1317A7CF-52F6-904C-99B4-41B51DC5E2CA}"/>
+              </a:ext>
+            </a:extLst>
+          </p:cNvPr>
+          <p:cNvSpPr txBox="1"/>
+          <p:nvPr/>
+        </p:nvSpPr>
+        <p:spPr>
+          <a:xfrm>
+            <a:off x="6903664" y="2399087"/>
+            <a:ext cx="317716" cy="246221"/>
+          </a:xfrm>
+          <a:prstGeom prst="rect">
+            <a:avLst/>
+          </a:prstGeom>
+          <a:noFill/>
+        </p:spPr>
+        <p:txBody>
+          <a:bodyPr wrap="square" rtlCol="0">
+            <a:spAutoFit/>
+          </a:bodyPr>
+          <a:lstStyle/>
+          <a:p>
+            <a:r>
+              <a:rPr lang="en-US" sz="1000" dirty="0"/>
+              <a:t>b1</a:t>
+            </a:r>
+          </a:p>
+        </p:txBody>
+      </p:sp>
+      <p:sp>
+        <p:nvSpPr>
+          <p:cNvPr id="331" name="Rectangle 330">
+            <a:extLst>
+              <a:ext uri="{FF2B5EF4-FFF2-40B4-BE49-F238E27FC236}">
+                <a16:creationId xmlns:a16="http://schemas.microsoft.com/office/drawing/2014/main" id="{FD5CE4DF-E1A1-AA47-9585-CD0FF0E2A5D8}"/>
+              </a:ext>
+            </a:extLst>
+          </p:cNvPr>
+          <p:cNvSpPr/>
+          <p:nvPr/>
+        </p:nvSpPr>
+        <p:spPr>
+          <a:xfrm>
+            <a:off x="6923566" y="2403900"/>
+            <a:ext cx="50400" cy="246221"/>
+          </a:xfrm>
+          <a:prstGeom prst="rect">
+            <a:avLst/>
+          </a:prstGeom>
+          <a:solidFill>
+            <a:schemeClr val="accent4">
+              <a:lumMod val="75000"/>
+            </a:schemeClr>
+          </a:solidFill>
+          <a:ln>
+            <a:noFill/>
+          </a:ln>
+        </p:spPr>
+        <p:style>
+          <a:lnRef idx="2">
+            <a:schemeClr val="accent1">
+              <a:shade val="50000"/>
+            </a:schemeClr>
+          </a:lnRef>
+          <a:fillRef idx="1">
+            <a:schemeClr val="accent1"/>
+          </a:fillRef>
+          <a:effectRef idx="0">
+            <a:schemeClr val="accent1"/>
+          </a:effectRef>
+          <a:fontRef idx="minor">
+            <a:schemeClr val="lt1"/>
+          </a:fontRef>
+        </p:style>
+        <p:txBody>
+          <a:bodyPr rtlCol="0" anchor="ctr"/>
+          <a:lstStyle/>
+          <a:p>
+            <a:pPr algn="ctr"/>
+            <a:endParaRPr lang="en-US"/>
+          </a:p>
+        </p:txBody>
+      </p:sp>
+      <p:sp>
+        <p:nvSpPr>
+          <p:cNvPr id="332" name="TextBox 331">
+            <a:extLst>
+              <a:ext uri="{FF2B5EF4-FFF2-40B4-BE49-F238E27FC236}">
+                <a16:creationId xmlns:a16="http://schemas.microsoft.com/office/drawing/2014/main" id="{AA1C2BE1-5B27-CE4F-B5B5-56618EEF29CA}"/>
+              </a:ext>
+            </a:extLst>
+          </p:cNvPr>
+          <p:cNvSpPr txBox="1"/>
+          <p:nvPr/>
+        </p:nvSpPr>
+        <p:spPr>
+          <a:xfrm>
+            <a:off x="7081319" y="2645308"/>
+            <a:ext cx="317716" cy="246221"/>
+          </a:xfrm>
+          <a:prstGeom prst="rect">
+            <a:avLst/>
+          </a:prstGeom>
+          <a:noFill/>
+        </p:spPr>
+        <p:txBody>
+          <a:bodyPr wrap="square" rtlCol="0">
+            <a:spAutoFit/>
+          </a:bodyPr>
+          <a:lstStyle/>
+          <a:p>
+            <a:r>
+              <a:rPr lang="en-US" sz="1000" dirty="0"/>
+              <a:t>b2</a:t>
+            </a:r>
+          </a:p>
+        </p:txBody>
+      </p:sp>
+      <p:sp>
+        <p:nvSpPr>
+          <p:cNvPr id="333" name="Rectangle 332">
+            <a:extLst>
+              <a:ext uri="{FF2B5EF4-FFF2-40B4-BE49-F238E27FC236}">
+                <a16:creationId xmlns:a16="http://schemas.microsoft.com/office/drawing/2014/main" id="{56376C49-D2CD-E642-A300-63BB6B48B6F0}"/>
+              </a:ext>
+            </a:extLst>
+          </p:cNvPr>
+          <p:cNvSpPr/>
+          <p:nvPr/>
+        </p:nvSpPr>
+        <p:spPr>
+          <a:xfrm>
+            <a:off x="7101221" y="2645308"/>
+            <a:ext cx="50400" cy="246221"/>
+          </a:xfrm>
+          <a:prstGeom prst="rect">
+            <a:avLst/>
+          </a:prstGeom>
+          <a:solidFill>
+            <a:schemeClr val="accent4">
+              <a:lumMod val="75000"/>
+            </a:schemeClr>
+          </a:solidFill>
+          <a:ln>
+            <a:noFill/>
+          </a:ln>
+        </p:spPr>
+        <p:style>
+          <a:lnRef idx="2">
+            <a:schemeClr val="accent1">
+              <a:shade val="50000"/>
+            </a:schemeClr>
+          </a:lnRef>
+          <a:fillRef idx="1">
+            <a:schemeClr val="accent1"/>
+          </a:fillRef>
+          <a:effectRef idx="0">
+            <a:schemeClr val="accent1"/>
+          </a:effectRef>
+          <a:fontRef idx="minor">
+            <a:schemeClr val="lt1"/>
+          </a:fontRef>
+        </p:style>
+        <p:txBody>
+          <a:bodyPr rtlCol="0" anchor="ctr"/>
+          <a:lstStyle/>
+          <a:p>
+            <a:pPr algn="ctr"/>
+            <a:endParaRPr lang="en-US"/>
+          </a:p>
+        </p:txBody>
+      </p:sp>
+      <p:sp>
+        <p:nvSpPr>
+          <p:cNvPr id="334" name="TextBox 333">
+            <a:extLst>
+              <a:ext uri="{FF2B5EF4-FFF2-40B4-BE49-F238E27FC236}">
+                <a16:creationId xmlns:a16="http://schemas.microsoft.com/office/drawing/2014/main" id="{D8803EA8-D3D4-084E-B662-A633EC1EB7EF}"/>
+              </a:ext>
+            </a:extLst>
+          </p:cNvPr>
+          <p:cNvSpPr txBox="1"/>
+          <p:nvPr/>
+        </p:nvSpPr>
+        <p:spPr>
+          <a:xfrm>
+            <a:off x="7320459" y="2886716"/>
+            <a:ext cx="317716" cy="246221"/>
+          </a:xfrm>
+          <a:prstGeom prst="rect">
+            <a:avLst/>
+          </a:prstGeom>
+          <a:noFill/>
+        </p:spPr>
+        <p:txBody>
+          <a:bodyPr wrap="square" rtlCol="0">
+            <a:spAutoFit/>
+          </a:bodyPr>
+          <a:lstStyle/>
+          <a:p>
+            <a:r>
+              <a:rPr lang="en-US" sz="1000" dirty="0"/>
+              <a:t>b3</a:t>
+            </a:r>
+          </a:p>
+        </p:txBody>
+      </p:sp>
+      <p:sp>
+        <p:nvSpPr>
+          <p:cNvPr id="335" name="Rectangle 334">
+            <a:extLst>
+              <a:ext uri="{FF2B5EF4-FFF2-40B4-BE49-F238E27FC236}">
+                <a16:creationId xmlns:a16="http://schemas.microsoft.com/office/drawing/2014/main" id="{35A46814-C58E-5048-8A34-DF0905A42399}"/>
+              </a:ext>
+            </a:extLst>
+          </p:cNvPr>
+          <p:cNvSpPr/>
+          <p:nvPr/>
+        </p:nvSpPr>
+        <p:spPr>
+          <a:xfrm>
+            <a:off x="7340362" y="2886716"/>
+            <a:ext cx="50400" cy="246221"/>
+          </a:xfrm>
+          <a:prstGeom prst="rect">
+            <a:avLst/>
+          </a:prstGeom>
+          <a:solidFill>
+            <a:schemeClr val="accent4">
+              <a:lumMod val="75000"/>
+            </a:schemeClr>
+          </a:solidFill>
+          <a:ln>
+            <a:noFill/>
+          </a:ln>
+        </p:spPr>
+        <p:style>
+          <a:lnRef idx="2">
+            <a:schemeClr val="accent1">
+              <a:shade val="50000"/>
+            </a:schemeClr>
+          </a:lnRef>
+          <a:fillRef idx="1">
+            <a:schemeClr val="accent1"/>
+          </a:fillRef>
+          <a:effectRef idx="0">
+            <a:schemeClr val="accent1"/>
+          </a:effectRef>
+          <a:fontRef idx="minor">
+            <a:schemeClr val="lt1"/>
+          </a:fontRef>
+        </p:style>
+        <p:txBody>
+          <a:bodyPr rtlCol="0" anchor="ctr"/>
+          <a:lstStyle/>
+          <a:p>
+            <a:pPr algn="ctr"/>
+            <a:endParaRPr lang="en-US"/>
+          </a:p>
+        </p:txBody>
+      </p:sp>
+      <p:sp>
+        <p:nvSpPr>
+          <p:cNvPr id="336" name="TextBox 335">
+            <a:extLst>
+              <a:ext uri="{FF2B5EF4-FFF2-40B4-BE49-F238E27FC236}">
+                <a16:creationId xmlns:a16="http://schemas.microsoft.com/office/drawing/2014/main" id="{2C313BF4-0C6A-3047-8D52-5782668893FA}"/>
+              </a:ext>
+            </a:extLst>
+          </p:cNvPr>
+          <p:cNvSpPr txBox="1"/>
+          <p:nvPr/>
+        </p:nvSpPr>
+        <p:spPr>
+          <a:xfrm>
+            <a:off x="7545702" y="3121043"/>
+            <a:ext cx="317716" cy="246221"/>
+          </a:xfrm>
+          <a:prstGeom prst="rect">
+            <a:avLst/>
+          </a:prstGeom>
+          <a:noFill/>
+        </p:spPr>
+        <p:txBody>
+          <a:bodyPr wrap="square" rtlCol="0">
+            <a:spAutoFit/>
+          </a:bodyPr>
+          <a:lstStyle/>
+          <a:p>
+            <a:r>
+              <a:rPr lang="en-US" sz="1000" dirty="0"/>
+              <a:t>b4</a:t>
+            </a:r>
+          </a:p>
+        </p:txBody>
+      </p:sp>
+      <p:sp>
+        <p:nvSpPr>
+          <p:cNvPr id="337" name="Rectangle 336">
+            <a:extLst>
+              <a:ext uri="{FF2B5EF4-FFF2-40B4-BE49-F238E27FC236}">
+                <a16:creationId xmlns:a16="http://schemas.microsoft.com/office/drawing/2014/main" id="{9493FA6A-5FD9-C141-8938-349A4A591CAC}"/>
+              </a:ext>
+            </a:extLst>
+          </p:cNvPr>
+          <p:cNvSpPr/>
+          <p:nvPr/>
+        </p:nvSpPr>
+        <p:spPr>
+          <a:xfrm>
+            <a:off x="7560687" y="3126359"/>
+            <a:ext cx="50400" cy="246550"/>
+          </a:xfrm>
+          <a:prstGeom prst="rect">
+            <a:avLst/>
+          </a:prstGeom>
+          <a:solidFill>
+            <a:schemeClr val="accent4">
+              <a:lumMod val="75000"/>
+            </a:schemeClr>
+          </a:solidFill>
+          <a:ln>
+            <a:noFill/>
+          </a:ln>
+        </p:spPr>
+        <p:style>
+          <a:lnRef idx="2">
+            <a:schemeClr val="accent1">
+              <a:shade val="50000"/>
+            </a:schemeClr>
+          </a:lnRef>
+          <a:fillRef idx="1">
+            <a:schemeClr val="accent1"/>
+          </a:fillRef>
+          <a:effectRef idx="0">
+            <a:schemeClr val="accent1"/>
+          </a:effectRef>
+          <a:fontRef idx="minor">
+            <a:schemeClr val="lt1"/>
+          </a:fontRef>
+        </p:style>
+        <p:txBody>
+          <a:bodyPr rtlCol="0" anchor="ctr"/>
+          <a:lstStyle/>
+          <a:p>
+            <a:pPr algn="ctr"/>
+            <a:endParaRPr lang="en-US"/>
+          </a:p>
+        </p:txBody>
+      </p:sp>
+      <p:sp>
+        <p:nvSpPr>
+          <p:cNvPr id="343" name="Rectangle 342">
+            <a:extLst>
+              <a:ext uri="{FF2B5EF4-FFF2-40B4-BE49-F238E27FC236}">
+                <a16:creationId xmlns:a16="http://schemas.microsoft.com/office/drawing/2014/main" id="{AAEE42AB-AD77-BB42-9CC8-6CCB1247CA62}"/>
+              </a:ext>
+            </a:extLst>
+          </p:cNvPr>
+          <p:cNvSpPr/>
+          <p:nvPr/>
+        </p:nvSpPr>
+        <p:spPr>
+          <a:xfrm>
+            <a:off x="10386802" y="3645922"/>
+            <a:ext cx="864973" cy="970660"/>
+          </a:xfrm>
+          <a:prstGeom prst="rect">
+            <a:avLst/>
+          </a:prstGeom>
+          <a:solidFill>
+            <a:srgbClr val="FFC000">
+              <a:alpha val="50000"/>
+            </a:srgbClr>
+          </a:solidFill>
+          <a:ln>
+            <a:noFill/>
+          </a:ln>
+        </p:spPr>
+        <p:style>
+          <a:lnRef idx="2">
+            <a:schemeClr val="accent1">
+              <a:shade val="50000"/>
+            </a:schemeClr>
+          </a:lnRef>
+          <a:fillRef idx="1">
+            <a:schemeClr val="accent1"/>
+          </a:fillRef>
+          <a:effectRef idx="0">
+            <a:schemeClr val="accent1"/>
+          </a:effectRef>
+          <a:fontRef idx="minor">
+            <a:schemeClr val="lt1"/>
+          </a:fontRef>
+        </p:style>
+        <p:txBody>
+          <a:bodyPr rtlCol="0" anchor="ctr"/>
+          <a:lstStyle/>
+          <a:p>
+            <a:pPr algn="ctr"/>
+            <a:endParaRPr lang="en-US" dirty="0"/>
+          </a:p>
+        </p:txBody>
+      </p:sp>
+      <p:sp>
+        <p:nvSpPr>
+          <p:cNvPr id="344" name="Rectangle 343">
+            <a:extLst>
+              <a:ext uri="{FF2B5EF4-FFF2-40B4-BE49-F238E27FC236}">
+                <a16:creationId xmlns:a16="http://schemas.microsoft.com/office/drawing/2014/main" id="{591D9CE5-5A92-6243-BAB8-CB73C54757ED}"/>
+              </a:ext>
+            </a:extLst>
+          </p:cNvPr>
+          <p:cNvSpPr/>
+          <p:nvPr/>
+        </p:nvSpPr>
+        <p:spPr>
+          <a:xfrm>
+            <a:off x="11247981" y="3643890"/>
+            <a:ext cx="583280" cy="963297"/>
+          </a:xfrm>
+          <a:prstGeom prst="rect">
+            <a:avLst/>
+          </a:prstGeom>
+          <a:solidFill>
+            <a:srgbClr val="FFFF00">
+              <a:alpha val="40000"/>
+            </a:srgbClr>
+          </a:solidFill>
+          <a:ln>
+            <a:noFill/>
+          </a:ln>
+        </p:spPr>
+        <p:style>
+          <a:lnRef idx="2">
+            <a:schemeClr val="accent1">
+              <a:shade val="50000"/>
+            </a:schemeClr>
+          </a:lnRef>
+          <a:fillRef idx="1">
+            <a:schemeClr val="accent1"/>
+          </a:fillRef>
+          <a:effectRef idx="0">
+            <a:schemeClr val="accent1"/>
+          </a:effectRef>
+          <a:fontRef idx="minor">
+            <a:schemeClr val="lt1"/>
+          </a:fontRef>
+        </p:style>
+        <p:txBody>
+          <a:bodyPr rtlCol="0" anchor="ctr"/>
+          <a:lstStyle/>
+          <a:p>
+            <a:pPr algn="ctr"/>
+            <a:endParaRPr lang="en-US"/>
+          </a:p>
+        </p:txBody>
+      </p:sp>
+      <p:sp>
+        <p:nvSpPr>
+          <p:cNvPr id="345" name="TextBox 344">
+            <a:extLst>
+              <a:ext uri="{FF2B5EF4-FFF2-40B4-BE49-F238E27FC236}">
+                <a16:creationId xmlns:a16="http://schemas.microsoft.com/office/drawing/2014/main" id="{50136647-C817-0E47-8EF2-ADF44F4F6EBF}"/>
+              </a:ext>
+            </a:extLst>
+          </p:cNvPr>
+          <p:cNvSpPr txBox="1"/>
+          <p:nvPr/>
+        </p:nvSpPr>
+        <p:spPr>
+          <a:xfrm>
+            <a:off x="11220476" y="3643610"/>
+            <a:ext cx="368039" cy="246221"/>
+          </a:xfrm>
+          <a:prstGeom prst="rect">
+            <a:avLst/>
+          </a:prstGeom>
+          <a:noFill/>
+        </p:spPr>
+        <p:txBody>
+          <a:bodyPr wrap="square" rtlCol="0">
+            <a:spAutoFit/>
+          </a:bodyPr>
+          <a:lstStyle/>
+          <a:p>
+            <a:r>
+              <a:rPr lang="en-US" sz="1000" dirty="0"/>
+              <a:t>rc1</a:t>
+            </a:r>
+          </a:p>
+        </p:txBody>
+      </p:sp>
+      <p:sp>
+        <p:nvSpPr>
+          <p:cNvPr id="346" name="Rectangle 345">
+            <a:extLst>
+              <a:ext uri="{FF2B5EF4-FFF2-40B4-BE49-F238E27FC236}">
+                <a16:creationId xmlns:a16="http://schemas.microsoft.com/office/drawing/2014/main" id="{CDC4CD46-A6F5-154C-9E14-EAAF761CF54E}"/>
+              </a:ext>
+            </a:extLst>
+          </p:cNvPr>
+          <p:cNvSpPr/>
+          <p:nvPr/>
+        </p:nvSpPr>
+        <p:spPr>
+          <a:xfrm>
+            <a:off x="11247156" y="3643610"/>
+            <a:ext cx="48106" cy="246221"/>
+          </a:xfrm>
+          <a:prstGeom prst="rect">
+            <a:avLst/>
+          </a:prstGeom>
+          <a:solidFill>
+            <a:schemeClr val="accent4"/>
+          </a:solidFill>
+          <a:ln>
+            <a:noFill/>
+          </a:ln>
+        </p:spPr>
+        <p:style>
+          <a:lnRef idx="2">
+            <a:schemeClr val="accent1">
+              <a:shade val="50000"/>
+            </a:schemeClr>
+          </a:lnRef>
+          <a:fillRef idx="1">
+            <a:schemeClr val="accent1"/>
+          </a:fillRef>
+          <a:effectRef idx="0">
+            <a:schemeClr val="accent1"/>
+          </a:effectRef>
+          <a:fontRef idx="minor">
+            <a:schemeClr val="lt1"/>
+          </a:fontRef>
+        </p:style>
+        <p:txBody>
+          <a:bodyPr rtlCol="0" anchor="ctr"/>
+          <a:lstStyle/>
+          <a:p>
+            <a:pPr algn="ctr"/>
+            <a:endParaRPr lang="en-US"/>
+          </a:p>
+        </p:txBody>
+      </p:sp>
+      <p:sp>
+        <p:nvSpPr>
+          <p:cNvPr id="347" name="TextBox 346">
+            <a:extLst>
+              <a:ext uri="{FF2B5EF4-FFF2-40B4-BE49-F238E27FC236}">
+                <a16:creationId xmlns:a16="http://schemas.microsoft.com/office/drawing/2014/main" id="{04F18F3F-44C7-8840-AC19-3A4E209C78BF}"/>
+              </a:ext>
+            </a:extLst>
+          </p:cNvPr>
+          <p:cNvSpPr txBox="1"/>
+          <p:nvPr/>
+        </p:nvSpPr>
+        <p:spPr>
+          <a:xfrm>
+            <a:off x="11504009" y="3895317"/>
+            <a:ext cx="368039" cy="246221"/>
+          </a:xfrm>
+          <a:prstGeom prst="rect">
+            <a:avLst/>
+          </a:prstGeom>
+          <a:noFill/>
+        </p:spPr>
+        <p:txBody>
+          <a:bodyPr wrap="square" rtlCol="0">
+            <a:spAutoFit/>
+          </a:bodyPr>
+          <a:lstStyle/>
+          <a:p>
+            <a:r>
+              <a:rPr lang="en-US" sz="1000" dirty="0"/>
+              <a:t>rc2</a:t>
+            </a:r>
+          </a:p>
+        </p:txBody>
+      </p:sp>
+      <p:sp>
+        <p:nvSpPr>
+          <p:cNvPr id="348" name="Rectangle 347">
+            <a:extLst>
+              <a:ext uri="{FF2B5EF4-FFF2-40B4-BE49-F238E27FC236}">
+                <a16:creationId xmlns:a16="http://schemas.microsoft.com/office/drawing/2014/main" id="{26D56B3E-0144-114F-937C-D0DE155E30B4}"/>
+              </a:ext>
+            </a:extLst>
+          </p:cNvPr>
+          <p:cNvSpPr/>
+          <p:nvPr/>
+        </p:nvSpPr>
+        <p:spPr>
+          <a:xfrm>
+            <a:off x="11530689" y="3895317"/>
+            <a:ext cx="48106" cy="246221"/>
+          </a:xfrm>
+          <a:prstGeom prst="rect">
+            <a:avLst/>
+          </a:prstGeom>
+          <a:solidFill>
+            <a:schemeClr val="accent4"/>
+          </a:solidFill>
+          <a:ln>
+            <a:noFill/>
+          </a:ln>
+        </p:spPr>
+        <p:style>
+          <a:lnRef idx="2">
+            <a:schemeClr val="accent1">
+              <a:shade val="50000"/>
+            </a:schemeClr>
+          </a:lnRef>
+          <a:fillRef idx="1">
+            <a:schemeClr val="accent1"/>
+          </a:fillRef>
+          <a:effectRef idx="0">
+            <a:schemeClr val="accent1"/>
+          </a:effectRef>
+          <a:fontRef idx="minor">
+            <a:schemeClr val="lt1"/>
+          </a:fontRef>
+        </p:style>
+        <p:txBody>
+          <a:bodyPr rtlCol="0" anchor="ctr"/>
+          <a:lstStyle/>
+          <a:p>
+            <a:pPr algn="ctr"/>
+            <a:endParaRPr lang="en-US"/>
+          </a:p>
+        </p:txBody>
+      </p:sp>
+      <p:sp>
+        <p:nvSpPr>
+          <p:cNvPr id="349" name="TextBox 348">
+            <a:extLst>
+              <a:ext uri="{FF2B5EF4-FFF2-40B4-BE49-F238E27FC236}">
+                <a16:creationId xmlns:a16="http://schemas.microsoft.com/office/drawing/2014/main" id="{18ED4A69-B76C-AD44-9764-EC627C8FBCED}"/>
+              </a:ext>
+            </a:extLst>
+          </p:cNvPr>
+          <p:cNvSpPr txBox="1"/>
+          <p:nvPr/>
+        </p:nvSpPr>
+        <p:spPr>
+          <a:xfrm>
+            <a:off x="10367505" y="3647458"/>
+            <a:ext cx="317716" cy="246221"/>
+          </a:xfrm>
+          <a:prstGeom prst="rect">
+            <a:avLst/>
+          </a:prstGeom>
+          <a:noFill/>
+        </p:spPr>
+        <p:txBody>
+          <a:bodyPr wrap="square" rtlCol="0">
+            <a:spAutoFit/>
+          </a:bodyPr>
+          <a:lstStyle/>
+          <a:p>
+            <a:r>
+              <a:rPr lang="en-US" sz="1000" dirty="0"/>
+              <a:t>b1</a:t>
+            </a:r>
+          </a:p>
+        </p:txBody>
+      </p:sp>
+      <p:sp>
+        <p:nvSpPr>
+          <p:cNvPr id="350" name="Rectangle 349">
+            <a:extLst>
+              <a:ext uri="{FF2B5EF4-FFF2-40B4-BE49-F238E27FC236}">
+                <a16:creationId xmlns:a16="http://schemas.microsoft.com/office/drawing/2014/main" id="{DBAD0314-9F0A-C742-94C4-EF361766842D}"/>
+              </a:ext>
+            </a:extLst>
+          </p:cNvPr>
+          <p:cNvSpPr/>
+          <p:nvPr/>
+        </p:nvSpPr>
+        <p:spPr>
+          <a:xfrm>
+            <a:off x="10382091" y="3652271"/>
+            <a:ext cx="50400" cy="246221"/>
+          </a:xfrm>
+          <a:prstGeom prst="rect">
+            <a:avLst/>
+          </a:prstGeom>
+          <a:solidFill>
+            <a:schemeClr val="accent4">
+              <a:lumMod val="75000"/>
+            </a:schemeClr>
+          </a:solidFill>
+          <a:ln>
+            <a:noFill/>
+          </a:ln>
+        </p:spPr>
+        <p:style>
+          <a:lnRef idx="2">
+            <a:schemeClr val="accent1">
+              <a:shade val="50000"/>
+            </a:schemeClr>
+          </a:lnRef>
+          <a:fillRef idx="1">
+            <a:schemeClr val="accent1"/>
+          </a:fillRef>
+          <a:effectRef idx="0">
+            <a:schemeClr val="accent1"/>
+          </a:effectRef>
+          <a:fontRef idx="minor">
+            <a:schemeClr val="lt1"/>
+          </a:fontRef>
+        </p:style>
+        <p:txBody>
+          <a:bodyPr rtlCol="0" anchor="ctr"/>
+          <a:lstStyle/>
+          <a:p>
+            <a:pPr algn="ctr"/>
+            <a:endParaRPr lang="en-US"/>
+          </a:p>
+        </p:txBody>
+      </p:sp>
+      <p:sp>
+        <p:nvSpPr>
+          <p:cNvPr id="359" name="TextBox 358">
+            <a:extLst>
+              <a:ext uri="{FF2B5EF4-FFF2-40B4-BE49-F238E27FC236}">
+                <a16:creationId xmlns:a16="http://schemas.microsoft.com/office/drawing/2014/main" id="{01E452E0-FAB7-8146-A3F4-EBEAA16C7270}"/>
+              </a:ext>
+            </a:extLst>
+          </p:cNvPr>
+          <p:cNvSpPr txBox="1"/>
+          <p:nvPr/>
+        </p:nvSpPr>
+        <p:spPr>
+          <a:xfrm>
+            <a:off x="10545160" y="3893679"/>
+            <a:ext cx="317716" cy="246221"/>
+          </a:xfrm>
+          <a:prstGeom prst="rect">
+            <a:avLst/>
+          </a:prstGeom>
+          <a:noFill/>
+        </p:spPr>
+        <p:txBody>
+          <a:bodyPr wrap="square" rtlCol="0">
+            <a:spAutoFit/>
+          </a:bodyPr>
+          <a:lstStyle/>
+          <a:p>
+            <a:r>
+              <a:rPr lang="en-US" sz="1000" dirty="0"/>
+              <a:t>b2</a:t>
+            </a:r>
+          </a:p>
+        </p:txBody>
+      </p:sp>
+      <p:sp>
+        <p:nvSpPr>
+          <p:cNvPr id="384" name="Rectangle 383">
+            <a:extLst>
+              <a:ext uri="{FF2B5EF4-FFF2-40B4-BE49-F238E27FC236}">
+                <a16:creationId xmlns:a16="http://schemas.microsoft.com/office/drawing/2014/main" id="{3A96540C-8827-F54D-A98B-B75D5CD499EF}"/>
+              </a:ext>
+            </a:extLst>
+          </p:cNvPr>
+          <p:cNvSpPr/>
+          <p:nvPr/>
+        </p:nvSpPr>
+        <p:spPr>
+          <a:xfrm>
+            <a:off x="10565062" y="3893679"/>
+            <a:ext cx="50400" cy="246221"/>
+          </a:xfrm>
+          <a:prstGeom prst="rect">
+            <a:avLst/>
+          </a:prstGeom>
+          <a:solidFill>
+            <a:schemeClr val="accent4">
+              <a:lumMod val="75000"/>
+            </a:schemeClr>
+          </a:solidFill>
+          <a:ln>
+            <a:noFill/>
+          </a:ln>
+        </p:spPr>
+        <p:style>
+          <a:lnRef idx="2">
+            <a:schemeClr val="accent1">
+              <a:shade val="50000"/>
+            </a:schemeClr>
+          </a:lnRef>
+          <a:fillRef idx="1">
+            <a:schemeClr val="accent1"/>
+          </a:fillRef>
+          <a:effectRef idx="0">
+            <a:schemeClr val="accent1"/>
+          </a:effectRef>
+          <a:fontRef idx="minor">
+            <a:schemeClr val="lt1"/>
+          </a:fontRef>
+        </p:style>
+        <p:txBody>
+          <a:bodyPr rtlCol="0" anchor="ctr"/>
+          <a:lstStyle/>
+          <a:p>
+            <a:pPr algn="ctr"/>
+            <a:endParaRPr lang="en-US"/>
+          </a:p>
+        </p:txBody>
+      </p:sp>
+      <p:sp>
+        <p:nvSpPr>
+          <p:cNvPr id="393" name="TextBox 392">
+            <a:extLst>
+              <a:ext uri="{FF2B5EF4-FFF2-40B4-BE49-F238E27FC236}">
+                <a16:creationId xmlns:a16="http://schemas.microsoft.com/office/drawing/2014/main" id="{0F57F7E2-6CA8-5E48-B8CD-AC2257A19C1E}"/>
+              </a:ext>
+            </a:extLst>
+          </p:cNvPr>
+          <p:cNvSpPr txBox="1"/>
+          <p:nvPr/>
+        </p:nvSpPr>
+        <p:spPr>
+          <a:xfrm>
+            <a:off x="10784300" y="4135087"/>
+            <a:ext cx="317716" cy="246221"/>
+          </a:xfrm>
+          <a:prstGeom prst="rect">
+            <a:avLst/>
+          </a:prstGeom>
+          <a:noFill/>
+        </p:spPr>
+        <p:txBody>
+          <a:bodyPr wrap="square" rtlCol="0">
+            <a:spAutoFit/>
+          </a:bodyPr>
+          <a:lstStyle/>
+          <a:p>
+            <a:r>
+              <a:rPr lang="en-US" sz="1000" dirty="0"/>
+              <a:t>b3</a:t>
+            </a:r>
+          </a:p>
+        </p:txBody>
+      </p:sp>
+      <p:sp>
+        <p:nvSpPr>
+          <p:cNvPr id="394" name="Rectangle 393">
+            <a:extLst>
+              <a:ext uri="{FF2B5EF4-FFF2-40B4-BE49-F238E27FC236}">
+                <a16:creationId xmlns:a16="http://schemas.microsoft.com/office/drawing/2014/main" id="{1F8CD2B0-E5FB-FD47-A2E0-C35DBF29D4A0}"/>
+              </a:ext>
+            </a:extLst>
+          </p:cNvPr>
+          <p:cNvSpPr/>
+          <p:nvPr/>
+        </p:nvSpPr>
+        <p:spPr>
+          <a:xfrm>
+            <a:off x="10804202" y="4135087"/>
+            <a:ext cx="50400" cy="246221"/>
+          </a:xfrm>
+          <a:prstGeom prst="rect">
+            <a:avLst/>
+          </a:prstGeom>
+          <a:solidFill>
+            <a:schemeClr val="accent4">
+              <a:lumMod val="75000"/>
+            </a:schemeClr>
+          </a:solidFill>
+          <a:ln>
+            <a:noFill/>
+          </a:ln>
+        </p:spPr>
+        <p:style>
+          <a:lnRef idx="2">
+            <a:schemeClr val="accent1">
+              <a:shade val="50000"/>
+            </a:schemeClr>
+          </a:lnRef>
+          <a:fillRef idx="1">
+            <a:schemeClr val="accent1"/>
+          </a:fillRef>
+          <a:effectRef idx="0">
+            <a:schemeClr val="accent1"/>
+          </a:effectRef>
+          <a:fontRef idx="minor">
+            <a:schemeClr val="lt1"/>
+          </a:fontRef>
+        </p:style>
+        <p:txBody>
+          <a:bodyPr rtlCol="0" anchor="ctr"/>
+          <a:lstStyle/>
+          <a:p>
+            <a:pPr algn="ctr"/>
+            <a:endParaRPr lang="en-US"/>
+          </a:p>
+        </p:txBody>
+      </p:sp>
+      <p:sp>
+        <p:nvSpPr>
+          <p:cNvPr id="395" name="TextBox 394">
+            <a:extLst>
+              <a:ext uri="{FF2B5EF4-FFF2-40B4-BE49-F238E27FC236}">
+                <a16:creationId xmlns:a16="http://schemas.microsoft.com/office/drawing/2014/main" id="{A22835F6-5B8B-0646-AA5C-B604D5D84897}"/>
+              </a:ext>
+            </a:extLst>
+          </p:cNvPr>
+          <p:cNvSpPr txBox="1"/>
+          <p:nvPr/>
+        </p:nvSpPr>
+        <p:spPr>
+          <a:xfrm>
+            <a:off x="11009543" y="4369414"/>
+            <a:ext cx="317716" cy="246221"/>
+          </a:xfrm>
+          <a:prstGeom prst="rect">
+            <a:avLst/>
+          </a:prstGeom>
+          <a:noFill/>
+        </p:spPr>
+        <p:txBody>
+          <a:bodyPr wrap="square" rtlCol="0">
+            <a:spAutoFit/>
+          </a:bodyPr>
+          <a:lstStyle/>
+          <a:p>
+            <a:r>
+              <a:rPr lang="en-US" sz="1000" dirty="0"/>
+              <a:t>b4</a:t>
+            </a:r>
+          </a:p>
+        </p:txBody>
+      </p:sp>
+      <p:sp>
+        <p:nvSpPr>
+          <p:cNvPr id="396" name="Rectangle 395">
+            <a:extLst>
+              <a:ext uri="{FF2B5EF4-FFF2-40B4-BE49-F238E27FC236}">
+                <a16:creationId xmlns:a16="http://schemas.microsoft.com/office/drawing/2014/main" id="{86876331-4737-374A-AACD-6620F258CF73}"/>
+              </a:ext>
+            </a:extLst>
+          </p:cNvPr>
+          <p:cNvSpPr/>
+          <p:nvPr/>
+        </p:nvSpPr>
+        <p:spPr>
+          <a:xfrm>
+            <a:off x="11016247" y="4374730"/>
+            <a:ext cx="50400" cy="241852"/>
+          </a:xfrm>
+          <a:prstGeom prst="rect">
+            <a:avLst/>
+          </a:prstGeom>
+          <a:solidFill>
+            <a:schemeClr val="accent4">
               <a:lumMod val="75000"/>
             </a:schemeClr>
           </a:solidFill>

</xml_diff>